<commit_message>
add explanation for exercise day 2
</commit_message>
<xml_diff>
--- a/2-excel-ai-magic-with-copilot/2-excel-ai-magic-with-copilot.pptx
+++ b/2-excel-ai-magic-with-copilot/2-excel-ai-magic-with-copilot.pptx
@@ -5,30 +5,31 @@
     <p:sldMasterId id="2147483648" r:id="rId1"/>
   </p:sldMasterIdLst>
   <p:notesMasterIdLst>
-    <p:notesMasterId r:id="rId23"/>
+    <p:notesMasterId r:id="rId24"/>
   </p:notesMasterIdLst>
   <p:sldIdLst>
     <p:sldId id="463" r:id="rId2"/>
     <p:sldId id="464" r:id="rId3"/>
-    <p:sldId id="404" r:id="rId4"/>
-    <p:sldId id="407" r:id="rId5"/>
-    <p:sldId id="469" r:id="rId6"/>
-    <p:sldId id="465" r:id="rId7"/>
-    <p:sldId id="466" r:id="rId8"/>
-    <p:sldId id="467" r:id="rId9"/>
-    <p:sldId id="468" r:id="rId10"/>
-    <p:sldId id="415" r:id="rId11"/>
-    <p:sldId id="405" r:id="rId12"/>
-    <p:sldId id="412" r:id="rId13"/>
-    <p:sldId id="470" r:id="rId14"/>
-    <p:sldId id="471" r:id="rId15"/>
-    <p:sldId id="413" r:id="rId16"/>
-    <p:sldId id="434" r:id="rId17"/>
-    <p:sldId id="433" r:id="rId18"/>
-    <p:sldId id="418" r:id="rId19"/>
-    <p:sldId id="472" r:id="rId20"/>
-    <p:sldId id="414" r:id="rId21"/>
-    <p:sldId id="417" r:id="rId22"/>
+    <p:sldId id="473" r:id="rId4"/>
+    <p:sldId id="404" r:id="rId5"/>
+    <p:sldId id="407" r:id="rId6"/>
+    <p:sldId id="469" r:id="rId7"/>
+    <p:sldId id="465" r:id="rId8"/>
+    <p:sldId id="466" r:id="rId9"/>
+    <p:sldId id="467" r:id="rId10"/>
+    <p:sldId id="468" r:id="rId11"/>
+    <p:sldId id="415" r:id="rId12"/>
+    <p:sldId id="405" r:id="rId13"/>
+    <p:sldId id="412" r:id="rId14"/>
+    <p:sldId id="470" r:id="rId15"/>
+    <p:sldId id="471" r:id="rId16"/>
+    <p:sldId id="413" r:id="rId17"/>
+    <p:sldId id="434" r:id="rId18"/>
+    <p:sldId id="433" r:id="rId19"/>
+    <p:sldId id="418" r:id="rId20"/>
+    <p:sldId id="472" r:id="rId21"/>
+    <p:sldId id="414" r:id="rId22"/>
+    <p:sldId id="417" r:id="rId23"/>
   </p:sldIdLst>
   <p:sldSz cx="18288000" cy="10287000"/>
   <p:notesSz cx="6858000" cy="9144000"/>
@@ -246,7 +247,7 @@
           <a:p>
             <a:fld id="{17A98A70-FA8C-4354-959C-C70678AC9BCF}" type="datetimeFigureOut">
               <a:rPr lang="en-US" smtClean="0"/>
-              <a:t>6/20/2025</a:t>
+              <a:t>6/24/2025</a:t>
             </a:fld>
             <a:endParaRPr lang="en-US"/>
           </a:p>
@@ -518,7 +519,13 @@
   <p:cSld>
     <p:spTree>
       <p:nvGrpSpPr>
-        <p:cNvPr id="1" name=""/>
+        <p:cNvPr id="1" name="">
+          <a:extLst>
+            <a:ext uri="{FF2B5EF4-FFF2-40B4-BE49-F238E27FC236}">
+              <a16:creationId xmlns:a16="http://schemas.microsoft.com/office/drawing/2014/main" id="{AAA6A1B6-C972-DDDC-F345-5529F07D8550}"/>
+            </a:ext>
+          </a:extLst>
+        </p:cNvPr>
         <p:cNvGrpSpPr/>
         <p:nvPr/>
       </p:nvGrpSpPr>
@@ -532,7 +539,13 @@
       </p:grpSpPr>
       <p:sp>
         <p:nvSpPr>
-          <p:cNvPr id="2" name="Slide Image Placeholder 1"/>
+          <p:cNvPr id="2" name="Slide Image Placeholder 1">
+            <a:extLst>
+              <a:ext uri="{FF2B5EF4-FFF2-40B4-BE49-F238E27FC236}">
+                <a16:creationId xmlns:a16="http://schemas.microsoft.com/office/drawing/2014/main" id="{5E2F6E4D-6A33-B880-06D1-D298153BC011}"/>
+              </a:ext>
+            </a:extLst>
+          </p:cNvPr>
           <p:cNvSpPr>
             <a:spLocks noGrp="1" noRot="1" noChangeAspect="1"/>
           </p:cNvSpPr>
@@ -544,7 +557,13 @@
       </p:sp>
       <p:sp>
         <p:nvSpPr>
-          <p:cNvPr id="3" name="Notes Placeholder 2"/>
+          <p:cNvPr id="3" name="Notes Placeholder 2">
+            <a:extLst>
+              <a:ext uri="{FF2B5EF4-FFF2-40B4-BE49-F238E27FC236}">
+                <a16:creationId xmlns:a16="http://schemas.microsoft.com/office/drawing/2014/main" id="{C623C8AA-D177-A9E0-0488-88C3D06372F8}"/>
+              </a:ext>
+            </a:extLst>
+          </p:cNvPr>
           <p:cNvSpPr>
             <a:spLocks noGrp="1"/>
           </p:cNvSpPr>
@@ -587,7 +606,13 @@
       </p:sp>
       <p:sp>
         <p:nvSpPr>
-          <p:cNvPr id="4" name="Slide Number Placeholder 3"/>
+          <p:cNvPr id="4" name="Slide Number Placeholder 3">
+            <a:extLst>
+              <a:ext uri="{FF2B5EF4-FFF2-40B4-BE49-F238E27FC236}">
+                <a16:creationId xmlns:a16="http://schemas.microsoft.com/office/drawing/2014/main" id="{DA96FB52-806F-E1C8-543D-0B805241C555}"/>
+              </a:ext>
+            </a:extLst>
+          </p:cNvPr>
           <p:cNvSpPr>
             <a:spLocks noGrp="1"/>
           </p:cNvSpPr>
@@ -602,7 +627,7 @@
           <a:p>
             <a:fld id="{1300335D-9F13-4B80-ADC5-B0EA3E10FF6B}" type="slidenum">
               <a:rPr lang="en-US" smtClean="0"/>
-              <a:t>4</a:t>
+              <a:t>3</a:t>
             </a:fld>
             <a:endParaRPr lang="en-US"/>
           </a:p>
@@ -611,7 +636,7 @@
     </p:spTree>
     <p:extLst>
       <p:ext uri="{BB962C8B-B14F-4D97-AF65-F5344CB8AC3E}">
-        <p14:creationId xmlns:p14="http://schemas.microsoft.com/office/powerpoint/2010/main" val="624549242"/>
+        <p14:creationId xmlns:p14="http://schemas.microsoft.com/office/powerpoint/2010/main" val="3967726866"/>
       </p:ext>
     </p:extLst>
   </p:cSld>
@@ -622,6 +647,138 @@
 </file>
 
 <file path=ppt/notesSlides/notesSlide10.xml><?xml version="1.0" encoding="utf-8"?>
+<p:notes xmlns:a="http://schemas.openxmlformats.org/drawingml/2006/main" xmlns:r="http://schemas.openxmlformats.org/officeDocument/2006/relationships" xmlns:p="http://schemas.openxmlformats.org/presentationml/2006/main">
+  <p:cSld>
+    <p:spTree>
+      <p:nvGrpSpPr>
+        <p:cNvPr id="1" name="">
+          <a:extLst>
+            <a:ext uri="{FF2B5EF4-FFF2-40B4-BE49-F238E27FC236}">
+              <a16:creationId xmlns:a16="http://schemas.microsoft.com/office/drawing/2014/main" id="{743C6F7D-97C7-02B4-D001-3BB80C0461D8}"/>
+            </a:ext>
+          </a:extLst>
+        </p:cNvPr>
+        <p:cNvGrpSpPr/>
+        <p:nvPr/>
+      </p:nvGrpSpPr>
+      <p:grpSpPr>
+        <a:xfrm>
+          <a:off x="0" y="0"/>
+          <a:ext cx="0" cy="0"/>
+          <a:chOff x="0" y="0"/>
+          <a:chExt cx="0" cy="0"/>
+        </a:xfrm>
+      </p:grpSpPr>
+      <p:sp>
+        <p:nvSpPr>
+          <p:cNvPr id="2" name="Slide Image Placeholder 1">
+            <a:extLst>
+              <a:ext uri="{FF2B5EF4-FFF2-40B4-BE49-F238E27FC236}">
+                <a16:creationId xmlns:a16="http://schemas.microsoft.com/office/drawing/2014/main" id="{87B25713-6F20-663A-BDEA-AC7A95CE251C}"/>
+              </a:ext>
+            </a:extLst>
+          </p:cNvPr>
+          <p:cNvSpPr>
+            <a:spLocks noGrp="1" noRot="1" noChangeAspect="1"/>
+          </p:cNvSpPr>
+          <p:nvPr>
+            <p:ph type="sldImg"/>
+          </p:nvPr>
+        </p:nvSpPr>
+        <p:spPr/>
+      </p:sp>
+      <p:sp>
+        <p:nvSpPr>
+          <p:cNvPr id="3" name="Notes Placeholder 2">
+            <a:extLst>
+              <a:ext uri="{FF2B5EF4-FFF2-40B4-BE49-F238E27FC236}">
+                <a16:creationId xmlns:a16="http://schemas.microsoft.com/office/drawing/2014/main" id="{7AB4FCBA-8619-28D7-714F-2FEA94758FA4}"/>
+              </a:ext>
+            </a:extLst>
+          </p:cNvPr>
+          <p:cNvSpPr>
+            <a:spLocks noGrp="1"/>
+          </p:cNvSpPr>
+          <p:nvPr>
+            <p:ph type="body" idx="1"/>
+          </p:nvPr>
+        </p:nvSpPr>
+        <p:spPr/>
+        <p:txBody>
+          <a:bodyPr/>
+          <a:lstStyle/>
+          <a:p>
+            <a:pPr marL="228600" indent="-228600">
+              <a:buAutoNum type="arabicPeriod"/>
+            </a:pPr>
+            <a:r>
+              <a:rPr lang="en-US" dirty="0"/>
+              <a:t>False!</a:t>
+            </a:r>
+          </a:p>
+          <a:p>
+            <a:pPr marL="228600" indent="-228600">
+              <a:buAutoNum type="arabicPeriod"/>
+            </a:pPr>
+            <a:r>
+              <a:rPr lang="en-US" dirty="0"/>
+              <a:t>Function, Formula, Function</a:t>
+            </a:r>
+          </a:p>
+          <a:p>
+            <a:pPr marL="228600" indent="-228600">
+              <a:buAutoNum type="arabicPeriod"/>
+            </a:pPr>
+            <a:r>
+              <a:rPr lang="en-US" dirty="0"/>
+              <a:t>Argument</a:t>
+            </a:r>
+          </a:p>
+        </p:txBody>
+      </p:sp>
+      <p:sp>
+        <p:nvSpPr>
+          <p:cNvPr id="4" name="Slide Number Placeholder 3">
+            <a:extLst>
+              <a:ext uri="{FF2B5EF4-FFF2-40B4-BE49-F238E27FC236}">
+                <a16:creationId xmlns:a16="http://schemas.microsoft.com/office/drawing/2014/main" id="{BD7E59B3-12B6-E800-523D-931F46836A80}"/>
+              </a:ext>
+            </a:extLst>
+          </p:cNvPr>
+          <p:cNvSpPr>
+            <a:spLocks noGrp="1"/>
+          </p:cNvSpPr>
+          <p:nvPr>
+            <p:ph type="sldNum" sz="quarter" idx="5"/>
+          </p:nvPr>
+        </p:nvSpPr>
+        <p:spPr/>
+        <p:txBody>
+          <a:bodyPr/>
+          <a:lstStyle/>
+          <a:p>
+            <a:fld id="{1300335D-9F13-4B80-ADC5-B0EA3E10FF6B}" type="slidenum">
+              <a:rPr lang="en-US" smtClean="0"/>
+              <a:t>19</a:t>
+            </a:fld>
+            <a:endParaRPr lang="en-US"/>
+          </a:p>
+        </p:txBody>
+      </p:sp>
+    </p:spTree>
+    <p:extLst>
+      <p:ext uri="{BB962C8B-B14F-4D97-AF65-F5344CB8AC3E}">
+        <p14:creationId xmlns:p14="http://schemas.microsoft.com/office/powerpoint/2010/main" val="3425286875"/>
+      </p:ext>
+    </p:extLst>
+  </p:cSld>
+  <p:clrMapOvr>
+    <a:masterClrMapping/>
+  </p:clrMapOvr>
+</p:notes>
+</file>
+
+<file path=ppt/notesSlides/notesSlide11.xml><?xml version="1.0" encoding="utf-8"?>
 <p:notes xmlns:a="http://schemas.openxmlformats.org/drawingml/2006/main" xmlns:r="http://schemas.openxmlformats.org/officeDocument/2006/relationships" xmlns:p="http://schemas.openxmlformats.org/presentationml/2006/main">
   <p:cSld>
     <p:spTree>
@@ -734,7 +891,7 @@
           <a:p>
             <a:fld id="{1300335D-9F13-4B80-ADC5-B0EA3E10FF6B}" type="slidenum">
               <a:rPr lang="en-US" smtClean="0"/>
-              <a:t>19</a:t>
+              <a:t>20</a:t>
             </a:fld>
             <a:endParaRPr lang="en-US"/>
           </a:p>
@@ -754,6 +911,114 @@
 </file>
 
 <file path=ppt/notesSlides/notesSlide2.xml><?xml version="1.0" encoding="utf-8"?>
+<p:notes xmlns:a="http://schemas.openxmlformats.org/drawingml/2006/main" xmlns:r="http://schemas.openxmlformats.org/officeDocument/2006/relationships" xmlns:p="http://schemas.openxmlformats.org/presentationml/2006/main">
+  <p:cSld>
+    <p:spTree>
+      <p:nvGrpSpPr>
+        <p:cNvPr id="1" name=""/>
+        <p:cNvGrpSpPr/>
+        <p:nvPr/>
+      </p:nvGrpSpPr>
+      <p:grpSpPr>
+        <a:xfrm>
+          <a:off x="0" y="0"/>
+          <a:ext cx="0" cy="0"/>
+          <a:chOff x="0" y="0"/>
+          <a:chExt cx="0" cy="0"/>
+        </a:xfrm>
+      </p:grpSpPr>
+      <p:sp>
+        <p:nvSpPr>
+          <p:cNvPr id="2" name="Slide Image Placeholder 1"/>
+          <p:cNvSpPr>
+            <a:spLocks noGrp="1" noRot="1" noChangeAspect="1"/>
+          </p:cNvSpPr>
+          <p:nvPr>
+            <p:ph type="sldImg"/>
+          </p:nvPr>
+        </p:nvSpPr>
+        <p:spPr/>
+      </p:sp>
+      <p:sp>
+        <p:nvSpPr>
+          <p:cNvPr id="3" name="Notes Placeholder 2"/>
+          <p:cNvSpPr>
+            <a:spLocks noGrp="1"/>
+          </p:cNvSpPr>
+          <p:nvPr>
+            <p:ph type="body" idx="1"/>
+          </p:nvPr>
+        </p:nvSpPr>
+        <p:spPr/>
+        <p:txBody>
+          <a:bodyPr/>
+          <a:lstStyle/>
+          <a:p>
+            <a:pPr marL="228600" indent="-228600">
+              <a:buAutoNum type="arabicPeriod"/>
+            </a:pPr>
+            <a:r>
+              <a:rPr lang="en-US" dirty="0"/>
+              <a:t>False!</a:t>
+            </a:r>
+          </a:p>
+          <a:p>
+            <a:pPr marL="228600" indent="-228600">
+              <a:buAutoNum type="arabicPeriod"/>
+            </a:pPr>
+            <a:r>
+              <a:rPr lang="en-US" dirty="0"/>
+              <a:t>Function, Formula, Function</a:t>
+            </a:r>
+          </a:p>
+          <a:p>
+            <a:pPr marL="228600" indent="-228600">
+              <a:buAutoNum type="arabicPeriod"/>
+            </a:pPr>
+            <a:r>
+              <a:rPr lang="en-US" dirty="0"/>
+              <a:t>Argument</a:t>
+            </a:r>
+          </a:p>
+        </p:txBody>
+      </p:sp>
+      <p:sp>
+        <p:nvSpPr>
+          <p:cNvPr id="4" name="Slide Number Placeholder 3"/>
+          <p:cNvSpPr>
+            <a:spLocks noGrp="1"/>
+          </p:cNvSpPr>
+          <p:nvPr>
+            <p:ph type="sldNum" sz="quarter" idx="5"/>
+          </p:nvPr>
+        </p:nvSpPr>
+        <p:spPr/>
+        <p:txBody>
+          <a:bodyPr/>
+          <a:lstStyle/>
+          <a:p>
+            <a:fld id="{1300335D-9F13-4B80-ADC5-B0EA3E10FF6B}" type="slidenum">
+              <a:rPr lang="en-US" smtClean="0"/>
+              <a:t>5</a:t>
+            </a:fld>
+            <a:endParaRPr lang="en-US"/>
+          </a:p>
+        </p:txBody>
+      </p:sp>
+    </p:spTree>
+    <p:extLst>
+      <p:ext uri="{BB962C8B-B14F-4D97-AF65-F5344CB8AC3E}">
+        <p14:creationId xmlns:p14="http://schemas.microsoft.com/office/powerpoint/2010/main" val="624549242"/>
+      </p:ext>
+    </p:extLst>
+  </p:cSld>
+  <p:clrMapOvr>
+    <a:masterClrMapping/>
+  </p:clrMapOvr>
+</p:notes>
+</file>
+
+<file path=ppt/notesSlides/notesSlide3.xml><?xml version="1.0" encoding="utf-8"?>
 <p:notes xmlns:a="http://schemas.openxmlformats.org/drawingml/2006/main" xmlns:r="http://schemas.openxmlformats.org/officeDocument/2006/relationships" xmlns:p="http://schemas.openxmlformats.org/presentationml/2006/main">
   <p:cSld>
     <p:spTree>
@@ -866,7 +1131,7 @@
           <a:p>
             <a:fld id="{1300335D-9F13-4B80-ADC5-B0EA3E10FF6B}" type="slidenum">
               <a:rPr lang="en-US" smtClean="0"/>
-              <a:t>7</a:t>
+              <a:t>8</a:t>
             </a:fld>
             <a:endParaRPr lang="en-US"/>
           </a:p>
@@ -885,7 +1150,7 @@
 </p:notes>
 </file>
 
-<file path=ppt/notesSlides/notesSlide3.xml><?xml version="1.0" encoding="utf-8"?>
+<file path=ppt/notesSlides/notesSlide4.xml><?xml version="1.0" encoding="utf-8"?>
 <p:notes xmlns:a="http://schemas.openxmlformats.org/drawingml/2006/main" xmlns:r="http://schemas.openxmlformats.org/officeDocument/2006/relationships" xmlns:p="http://schemas.openxmlformats.org/presentationml/2006/main">
   <p:cSld>
     <p:spTree>
@@ -998,7 +1263,7 @@
           <a:p>
             <a:fld id="{1300335D-9F13-4B80-ADC5-B0EA3E10FF6B}" type="slidenum">
               <a:rPr lang="en-US" smtClean="0"/>
-              <a:t>8</a:t>
+              <a:t>9</a:t>
             </a:fld>
             <a:endParaRPr lang="en-US"/>
           </a:p>
@@ -1017,7 +1282,7 @@
 </p:notes>
 </file>
 
-<file path=ppt/notesSlides/notesSlide4.xml><?xml version="1.0" encoding="utf-8"?>
+<file path=ppt/notesSlides/notesSlide5.xml><?xml version="1.0" encoding="utf-8"?>
 <p:notes xmlns:a="http://schemas.openxmlformats.org/drawingml/2006/main" xmlns:r="http://schemas.openxmlformats.org/officeDocument/2006/relationships" xmlns:p="http://schemas.openxmlformats.org/presentationml/2006/main">
   <p:cSld>
     <p:spTree>
@@ -1130,7 +1395,7 @@
           <a:p>
             <a:fld id="{1300335D-9F13-4B80-ADC5-B0EA3E10FF6B}" type="slidenum">
               <a:rPr lang="en-US" smtClean="0"/>
-              <a:t>9</a:t>
+              <a:t>10</a:t>
             </a:fld>
             <a:endParaRPr lang="en-US"/>
           </a:p>
@@ -1149,7 +1414,7 @@
 </p:notes>
 </file>
 
-<file path=ppt/notesSlides/notesSlide5.xml><?xml version="1.0" encoding="utf-8"?>
+<file path=ppt/notesSlides/notesSlide6.xml><?xml version="1.0" encoding="utf-8"?>
 <p:notes xmlns:a="http://schemas.openxmlformats.org/drawingml/2006/main" xmlns:r="http://schemas.openxmlformats.org/officeDocument/2006/relationships" xmlns:p="http://schemas.openxmlformats.org/presentationml/2006/main">
   <p:cSld>
     <p:spTree>
@@ -1238,7 +1503,7 @@
           <a:p>
             <a:fld id="{1300335D-9F13-4B80-ADC5-B0EA3E10FF6B}" type="slidenum">
               <a:rPr lang="en-US" smtClean="0"/>
-              <a:t>12</a:t>
+              <a:t>13</a:t>
             </a:fld>
             <a:endParaRPr lang="en-US"/>
           </a:p>
@@ -1257,7 +1522,7 @@
 </p:notes>
 </file>
 
-<file path=ppt/notesSlides/notesSlide6.xml><?xml version="1.0" encoding="utf-8"?>
+<file path=ppt/notesSlides/notesSlide7.xml><?xml version="1.0" encoding="utf-8"?>
 <p:notes xmlns:a="http://schemas.openxmlformats.org/drawingml/2006/main" xmlns:r="http://schemas.openxmlformats.org/officeDocument/2006/relationships" xmlns:p="http://schemas.openxmlformats.org/presentationml/2006/main">
   <p:cSld>
     <p:spTree>
@@ -1370,7 +1635,7 @@
           <a:p>
             <a:fld id="{1300335D-9F13-4B80-ADC5-B0EA3E10FF6B}" type="slidenum">
               <a:rPr lang="en-US" smtClean="0"/>
-              <a:t>13</a:t>
+              <a:t>14</a:t>
             </a:fld>
             <a:endParaRPr lang="en-US"/>
           </a:p>
@@ -1389,7 +1654,7 @@
 </p:notes>
 </file>
 
-<file path=ppt/notesSlides/notesSlide7.xml><?xml version="1.0" encoding="utf-8"?>
+<file path=ppt/notesSlides/notesSlide8.xml><?xml version="1.0" encoding="utf-8"?>
 <p:notes xmlns:a="http://schemas.openxmlformats.org/drawingml/2006/main" xmlns:r="http://schemas.openxmlformats.org/officeDocument/2006/relationships" xmlns:p="http://schemas.openxmlformats.org/presentationml/2006/main">
   <p:cSld>
     <p:spTree>
@@ -1502,7 +1767,7 @@
           <a:p>
             <a:fld id="{1300335D-9F13-4B80-ADC5-B0EA3E10FF6B}" type="slidenum">
               <a:rPr lang="en-US" smtClean="0"/>
-              <a:t>14</a:t>
+              <a:t>15</a:t>
             </a:fld>
             <a:endParaRPr lang="en-US"/>
           </a:p>
@@ -1521,7 +1786,7 @@
 </p:notes>
 </file>
 
-<file path=ppt/notesSlides/notesSlide8.xml><?xml version="1.0" encoding="utf-8"?>
+<file path=ppt/notesSlides/notesSlide9.xml><?xml version="1.0" encoding="utf-8"?>
 <p:notes xmlns:a="http://schemas.openxmlformats.org/drawingml/2006/main" xmlns:r="http://schemas.openxmlformats.org/officeDocument/2006/relationships" xmlns:p="http://schemas.openxmlformats.org/presentationml/2006/main">
   <p:cSld>
     <p:spTree>
@@ -1610,7 +1875,7 @@
           <a:p>
             <a:fld id="{1300335D-9F13-4B80-ADC5-B0EA3E10FF6B}" type="slidenum">
               <a:rPr lang="en-US" smtClean="0"/>
-              <a:t>15</a:t>
+              <a:t>16</a:t>
             </a:fld>
             <a:endParaRPr lang="en-US"/>
           </a:p>
@@ -1620,138 +1885,6 @@
     <p:extLst>
       <p:ext uri="{BB962C8B-B14F-4D97-AF65-F5344CB8AC3E}">
         <p14:creationId xmlns:p14="http://schemas.microsoft.com/office/powerpoint/2010/main" val="377014208"/>
-      </p:ext>
-    </p:extLst>
-  </p:cSld>
-  <p:clrMapOvr>
-    <a:masterClrMapping/>
-  </p:clrMapOvr>
-</p:notes>
-</file>
-
-<file path=ppt/notesSlides/notesSlide9.xml><?xml version="1.0" encoding="utf-8"?>
-<p:notes xmlns:a="http://schemas.openxmlformats.org/drawingml/2006/main" xmlns:r="http://schemas.openxmlformats.org/officeDocument/2006/relationships" xmlns:p="http://schemas.openxmlformats.org/presentationml/2006/main">
-  <p:cSld>
-    <p:spTree>
-      <p:nvGrpSpPr>
-        <p:cNvPr id="1" name="">
-          <a:extLst>
-            <a:ext uri="{FF2B5EF4-FFF2-40B4-BE49-F238E27FC236}">
-              <a16:creationId xmlns:a16="http://schemas.microsoft.com/office/drawing/2014/main" id="{743C6F7D-97C7-02B4-D001-3BB80C0461D8}"/>
-            </a:ext>
-          </a:extLst>
-        </p:cNvPr>
-        <p:cNvGrpSpPr/>
-        <p:nvPr/>
-      </p:nvGrpSpPr>
-      <p:grpSpPr>
-        <a:xfrm>
-          <a:off x="0" y="0"/>
-          <a:ext cx="0" cy="0"/>
-          <a:chOff x="0" y="0"/>
-          <a:chExt cx="0" cy="0"/>
-        </a:xfrm>
-      </p:grpSpPr>
-      <p:sp>
-        <p:nvSpPr>
-          <p:cNvPr id="2" name="Slide Image Placeholder 1">
-            <a:extLst>
-              <a:ext uri="{FF2B5EF4-FFF2-40B4-BE49-F238E27FC236}">
-                <a16:creationId xmlns:a16="http://schemas.microsoft.com/office/drawing/2014/main" id="{87B25713-6F20-663A-BDEA-AC7A95CE251C}"/>
-              </a:ext>
-            </a:extLst>
-          </p:cNvPr>
-          <p:cNvSpPr>
-            <a:spLocks noGrp="1" noRot="1" noChangeAspect="1"/>
-          </p:cNvSpPr>
-          <p:nvPr>
-            <p:ph type="sldImg"/>
-          </p:nvPr>
-        </p:nvSpPr>
-        <p:spPr/>
-      </p:sp>
-      <p:sp>
-        <p:nvSpPr>
-          <p:cNvPr id="3" name="Notes Placeholder 2">
-            <a:extLst>
-              <a:ext uri="{FF2B5EF4-FFF2-40B4-BE49-F238E27FC236}">
-                <a16:creationId xmlns:a16="http://schemas.microsoft.com/office/drawing/2014/main" id="{7AB4FCBA-8619-28D7-714F-2FEA94758FA4}"/>
-              </a:ext>
-            </a:extLst>
-          </p:cNvPr>
-          <p:cNvSpPr>
-            <a:spLocks noGrp="1"/>
-          </p:cNvSpPr>
-          <p:nvPr>
-            <p:ph type="body" idx="1"/>
-          </p:nvPr>
-        </p:nvSpPr>
-        <p:spPr/>
-        <p:txBody>
-          <a:bodyPr/>
-          <a:lstStyle/>
-          <a:p>
-            <a:pPr marL="228600" indent="-228600">
-              <a:buAutoNum type="arabicPeriod"/>
-            </a:pPr>
-            <a:r>
-              <a:rPr lang="en-US" dirty="0"/>
-              <a:t>False!</a:t>
-            </a:r>
-          </a:p>
-          <a:p>
-            <a:pPr marL="228600" indent="-228600">
-              <a:buAutoNum type="arabicPeriod"/>
-            </a:pPr>
-            <a:r>
-              <a:rPr lang="en-US" dirty="0"/>
-              <a:t>Function, Formula, Function</a:t>
-            </a:r>
-          </a:p>
-          <a:p>
-            <a:pPr marL="228600" indent="-228600">
-              <a:buAutoNum type="arabicPeriod"/>
-            </a:pPr>
-            <a:r>
-              <a:rPr lang="en-US" dirty="0"/>
-              <a:t>Argument</a:t>
-            </a:r>
-          </a:p>
-        </p:txBody>
-      </p:sp>
-      <p:sp>
-        <p:nvSpPr>
-          <p:cNvPr id="4" name="Slide Number Placeholder 3">
-            <a:extLst>
-              <a:ext uri="{FF2B5EF4-FFF2-40B4-BE49-F238E27FC236}">
-                <a16:creationId xmlns:a16="http://schemas.microsoft.com/office/drawing/2014/main" id="{BD7E59B3-12B6-E800-523D-931F46836A80}"/>
-              </a:ext>
-            </a:extLst>
-          </p:cNvPr>
-          <p:cNvSpPr>
-            <a:spLocks noGrp="1"/>
-          </p:cNvSpPr>
-          <p:nvPr>
-            <p:ph type="sldNum" sz="quarter" idx="5"/>
-          </p:nvPr>
-        </p:nvSpPr>
-        <p:spPr/>
-        <p:txBody>
-          <a:bodyPr/>
-          <a:lstStyle/>
-          <a:p>
-            <a:fld id="{1300335D-9F13-4B80-ADC5-B0EA3E10FF6B}" type="slidenum">
-              <a:rPr lang="en-US" smtClean="0"/>
-              <a:t>18</a:t>
-            </a:fld>
-            <a:endParaRPr lang="en-US"/>
-          </a:p>
-        </p:txBody>
-      </p:sp>
-    </p:spTree>
-    <p:extLst>
-      <p:ext uri="{BB962C8B-B14F-4D97-AF65-F5344CB8AC3E}">
-        <p14:creationId xmlns:p14="http://schemas.microsoft.com/office/powerpoint/2010/main" val="3425286875"/>
       </p:ext>
     </p:extLst>
   </p:cSld>
@@ -1941,7 +2074,7 @@
             <a:fld id="{1D8BD707-D9CF-40AE-B4C6-C98DA3205C09}" type="datetimeFigureOut">
               <a:rPr lang="en-US" smtClean="0"/>
               <a:pPr/>
-              <a:t>6/20/2025</a:t>
+              <a:t>6/24/2025</a:t>
             </a:fld>
             <a:endParaRPr lang="en-US"/>
           </a:p>
@@ -2106,7 +2239,7 @@
             <a:fld id="{1D8BD707-D9CF-40AE-B4C6-C98DA3205C09}" type="datetimeFigureOut">
               <a:rPr lang="en-US" smtClean="0"/>
               <a:pPr/>
-              <a:t>6/20/2025</a:t>
+              <a:t>6/24/2025</a:t>
             </a:fld>
             <a:endParaRPr lang="en-US"/>
           </a:p>
@@ -2281,7 +2414,7 @@
             <a:fld id="{1D8BD707-D9CF-40AE-B4C6-C98DA3205C09}" type="datetimeFigureOut">
               <a:rPr lang="en-US" smtClean="0"/>
               <a:pPr/>
-              <a:t>6/20/2025</a:t>
+              <a:t>6/24/2025</a:t>
             </a:fld>
             <a:endParaRPr lang="en-US"/>
           </a:p>
@@ -2446,7 +2579,7 @@
             <a:fld id="{1D8BD707-D9CF-40AE-B4C6-C98DA3205C09}" type="datetimeFigureOut">
               <a:rPr lang="en-US" smtClean="0"/>
               <a:pPr/>
-              <a:t>6/20/2025</a:t>
+              <a:t>6/24/2025</a:t>
             </a:fld>
             <a:endParaRPr lang="en-US"/>
           </a:p>
@@ -2688,7 +2821,7 @@
             <a:fld id="{1D8BD707-D9CF-40AE-B4C6-C98DA3205C09}" type="datetimeFigureOut">
               <a:rPr lang="en-US" smtClean="0"/>
               <a:pPr/>
-              <a:t>6/20/2025</a:t>
+              <a:t>6/24/2025</a:t>
             </a:fld>
             <a:endParaRPr lang="en-US"/>
           </a:p>
@@ -2970,7 +3103,7 @@
             <a:fld id="{1D8BD707-D9CF-40AE-B4C6-C98DA3205C09}" type="datetimeFigureOut">
               <a:rPr lang="en-US" smtClean="0"/>
               <a:pPr/>
-              <a:t>6/20/2025</a:t>
+              <a:t>6/24/2025</a:t>
             </a:fld>
             <a:endParaRPr lang="en-US"/>
           </a:p>
@@ -3386,7 +3519,7 @@
             <a:fld id="{1D8BD707-D9CF-40AE-B4C6-C98DA3205C09}" type="datetimeFigureOut">
               <a:rPr lang="en-US" smtClean="0"/>
               <a:pPr/>
-              <a:t>6/20/2025</a:t>
+              <a:t>6/24/2025</a:t>
             </a:fld>
             <a:endParaRPr lang="en-US"/>
           </a:p>
@@ -3500,7 +3633,7 @@
             <a:fld id="{1D8BD707-D9CF-40AE-B4C6-C98DA3205C09}" type="datetimeFigureOut">
               <a:rPr lang="en-US" smtClean="0"/>
               <a:pPr/>
-              <a:t>6/20/2025</a:t>
+              <a:t>6/24/2025</a:t>
             </a:fld>
             <a:endParaRPr lang="en-US"/>
           </a:p>
@@ -3592,7 +3725,7 @@
             <a:fld id="{1D8BD707-D9CF-40AE-B4C6-C98DA3205C09}" type="datetimeFigureOut">
               <a:rPr lang="en-US" smtClean="0"/>
               <a:pPr/>
-              <a:t>6/20/2025</a:t>
+              <a:t>6/24/2025</a:t>
             </a:fld>
             <a:endParaRPr lang="en-US"/>
           </a:p>
@@ -3864,7 +3997,7 @@
             <a:fld id="{1D8BD707-D9CF-40AE-B4C6-C98DA3205C09}" type="datetimeFigureOut">
               <a:rPr lang="en-US" smtClean="0"/>
               <a:pPr/>
-              <a:t>6/20/2025</a:t>
+              <a:t>6/24/2025</a:t>
             </a:fld>
             <a:endParaRPr lang="en-US"/>
           </a:p>
@@ -4113,7 +4246,7 @@
             <a:fld id="{1D8BD707-D9CF-40AE-B4C6-C98DA3205C09}" type="datetimeFigureOut">
               <a:rPr lang="en-US" smtClean="0"/>
               <a:pPr/>
-              <a:t>6/20/2025</a:t>
+              <a:t>6/24/2025</a:t>
             </a:fld>
             <a:endParaRPr lang="en-US"/>
           </a:p>
@@ -4326,7 +4459,7 @@
             <a:fld id="{1D8BD707-D9CF-40AE-B4C6-C98DA3205C09}" type="datetimeFigureOut">
               <a:rPr lang="en-US" smtClean="0"/>
               <a:pPr/>
-              <a:t>6/20/2025</a:t>
+              <a:t>6/24/2025</a:t>
             </a:fld>
             <a:endParaRPr lang="en-US"/>
           </a:p>
@@ -4867,6 +5000,328 @@
   <p:cSld>
     <p:spTree>
       <p:nvGrpSpPr>
+        <p:cNvPr id="1" name="">
+          <a:extLst>
+            <a:ext uri="{FF2B5EF4-FFF2-40B4-BE49-F238E27FC236}">
+              <a16:creationId xmlns:a16="http://schemas.microsoft.com/office/drawing/2014/main" id="{1D08595B-B0F6-3D15-07B7-C94576D901BB}"/>
+            </a:ext>
+          </a:extLst>
+        </p:cNvPr>
+        <p:cNvGrpSpPr/>
+        <p:nvPr/>
+      </p:nvGrpSpPr>
+      <p:grpSpPr>
+        <a:xfrm>
+          <a:off x="0" y="0"/>
+          <a:ext cx="0" cy="0"/>
+          <a:chOff x="0" y="0"/>
+          <a:chExt cx="0" cy="0"/>
+        </a:xfrm>
+      </p:grpSpPr>
+      <p:sp>
+        <p:nvSpPr>
+          <p:cNvPr id="4" name="Rectangle 3">
+            <a:extLst>
+              <a:ext uri="{FF2B5EF4-FFF2-40B4-BE49-F238E27FC236}">
+                <a16:creationId xmlns:a16="http://schemas.microsoft.com/office/drawing/2014/main" id="{D2164974-38B7-0BB3-1F4A-12AF2DBA4615}"/>
+              </a:ext>
+            </a:extLst>
+          </p:cNvPr>
+          <p:cNvSpPr/>
+          <p:nvPr/>
+        </p:nvSpPr>
+        <p:spPr>
+          <a:xfrm>
+            <a:off x="10820400" y="0"/>
+            <a:ext cx="7467600" cy="10287000"/>
+          </a:xfrm>
+          <a:prstGeom prst="rect">
+            <a:avLst/>
+          </a:prstGeom>
+          <a:solidFill>
+            <a:srgbClr val="CF3338"/>
+          </a:solidFill>
+          <a:ln>
+            <a:noFill/>
+          </a:ln>
+        </p:spPr>
+        <p:style>
+          <a:lnRef idx="2">
+            <a:schemeClr val="accent1">
+              <a:shade val="50000"/>
+            </a:schemeClr>
+          </a:lnRef>
+          <a:fillRef idx="1">
+            <a:schemeClr val="accent1"/>
+          </a:fillRef>
+          <a:effectRef idx="0">
+            <a:schemeClr val="accent1"/>
+          </a:effectRef>
+          <a:fontRef idx="minor">
+            <a:schemeClr val="lt1"/>
+          </a:fontRef>
+        </p:style>
+        <p:txBody>
+          <a:bodyPr rtlCol="0" anchor="ctr"/>
+          <a:lstStyle/>
+          <a:p>
+            <a:pPr algn="ctr"/>
+            <a:endParaRPr lang="en-US" sz="2700"/>
+          </a:p>
+        </p:txBody>
+      </p:sp>
+      <p:pic>
+        <p:nvPicPr>
+          <p:cNvPr id="2" name="Picture 1">
+            <a:extLst>
+              <a:ext uri="{FF2B5EF4-FFF2-40B4-BE49-F238E27FC236}">
+                <a16:creationId xmlns:a16="http://schemas.microsoft.com/office/drawing/2014/main" id="{3B16401F-D91C-1A9E-AB41-9BB7999B59A3}"/>
+              </a:ext>
+            </a:extLst>
+          </p:cNvPr>
+          <p:cNvPicPr>
+            <a:picLocks noChangeAspect="1"/>
+          </p:cNvPicPr>
+          <p:nvPr/>
+        </p:nvPicPr>
+        <p:blipFill rotWithShape="1">
+          <a:blip r:embed="rId3">
+            <a:extLst>
+              <a:ext uri="{28A0092B-C50C-407E-A947-70E740481C1C}">
+                <a14:useLocalDpi xmlns:a14="http://schemas.microsoft.com/office/drawing/2010/main" val="0"/>
+              </a:ext>
+            </a:extLst>
+          </a:blip>
+          <a:srcRect l="69227" t="33418" r="20112" b="50548"/>
+          <a:stretch/>
+        </p:blipFill>
+        <p:spPr>
+          <a:xfrm>
+            <a:off x="15579524" y="7544693"/>
+            <a:ext cx="2708477" cy="2987579"/>
+          </a:xfrm>
+          <a:prstGeom prst="rect">
+            <a:avLst/>
+          </a:prstGeom>
+        </p:spPr>
+      </p:pic>
+      <p:sp>
+        <p:nvSpPr>
+          <p:cNvPr id="3" name="TextBox 2">
+            <a:extLst>
+              <a:ext uri="{FF2B5EF4-FFF2-40B4-BE49-F238E27FC236}">
+                <a16:creationId xmlns:a16="http://schemas.microsoft.com/office/drawing/2014/main" id="{E68C40A9-B365-4386-CB2C-8AB566EEE6AD}"/>
+              </a:ext>
+            </a:extLst>
+          </p:cNvPr>
+          <p:cNvSpPr txBox="1"/>
+          <p:nvPr/>
+        </p:nvSpPr>
+        <p:spPr>
+          <a:xfrm>
+            <a:off x="228600" y="114300"/>
+            <a:ext cx="10352567" cy="10365915"/>
+          </a:xfrm>
+          <a:prstGeom prst="rect">
+            <a:avLst/>
+          </a:prstGeom>
+          <a:noFill/>
+        </p:spPr>
+        <p:txBody>
+          <a:bodyPr wrap="square" rtlCol="0">
+            <a:spAutoFit/>
+          </a:bodyPr>
+          <a:lstStyle/>
+          <a:p>
+            <a:r>
+              <a:rPr lang="en-US" sz="6000" b="1" dirty="0">
+                <a:solidFill>
+                  <a:srgbClr val="CF3338"/>
+                </a:solidFill>
+                <a:latin typeface="Pragmatica" panose="020B0403040502020204" pitchFamily="34" charset="0"/>
+              </a:rPr>
+              <a:t>Creating advanced data visualizations with Copilot EXERCISE</a:t>
+            </a:r>
+          </a:p>
+          <a:p>
+            <a:pPr marL="142875">
+              <a:lnSpc>
+                <a:spcPct val="115000"/>
+              </a:lnSpc>
+              <a:spcBef>
+                <a:spcPts val="1125"/>
+              </a:spcBef>
+              <a:buClr>
+                <a:srgbClr val="C00000"/>
+              </a:buClr>
+              <a:buSzPts val="2100"/>
+            </a:pPr>
+            <a:r>
+              <a:rPr lang="en-US" sz="3600" dirty="0">
+                <a:solidFill>
+                  <a:srgbClr val="C00000"/>
+                </a:solidFill>
+                <a:latin typeface="Pragmatica" panose="020B0403040502020204"/>
+                <a:sym typeface="Consolas"/>
+              </a:rPr>
+              <a:t>Dataset: copilot-dashboard-start.xlsx</a:t>
+            </a:r>
+          </a:p>
+          <a:p>
+            <a:pPr marL="714375" indent="-571500">
+              <a:lnSpc>
+                <a:spcPct val="115000"/>
+              </a:lnSpc>
+              <a:spcBef>
+                <a:spcPts val="1125"/>
+              </a:spcBef>
+              <a:buClr>
+                <a:srgbClr val="C00000"/>
+              </a:buClr>
+              <a:buSzPts val="2100"/>
+              <a:buFont typeface="Arial" panose="020B0604020202020204" pitchFamily="34" charset="0"/>
+              <a:buChar char="•"/>
+            </a:pPr>
+            <a:endParaRPr lang="en-US" sz="3600" dirty="0">
+              <a:solidFill>
+                <a:srgbClr val="C00000"/>
+              </a:solidFill>
+              <a:latin typeface="Pragmatica" panose="020B0403040502020204"/>
+              <a:sym typeface="Consolas"/>
+            </a:endParaRPr>
+          </a:p>
+          <a:p>
+            <a:pPr marL="714375" indent="-571500">
+              <a:lnSpc>
+                <a:spcPct val="115000"/>
+              </a:lnSpc>
+              <a:spcBef>
+                <a:spcPts val="1125"/>
+              </a:spcBef>
+              <a:buClr>
+                <a:srgbClr val="C00000"/>
+              </a:buClr>
+              <a:buSzPts val="2100"/>
+              <a:buFont typeface="Arial" panose="020B0604020202020204" pitchFamily="34" charset="0"/>
+              <a:buChar char="•"/>
+            </a:pPr>
+            <a:r>
+              <a:rPr lang="en-US" sz="3600" dirty="0">
+                <a:solidFill>
+                  <a:srgbClr val="C00000"/>
+                </a:solidFill>
+                <a:latin typeface="Pragmatica" panose="020B0403040502020204"/>
+                <a:sym typeface="Consolas"/>
+              </a:rPr>
+              <a:t>Use Advanced Analysis to create visualizations for a dashboard</a:t>
+            </a:r>
+          </a:p>
+          <a:p>
+            <a:pPr marL="714375" indent="-571500">
+              <a:lnSpc>
+                <a:spcPct val="115000"/>
+              </a:lnSpc>
+              <a:spcBef>
+                <a:spcPts val="1125"/>
+              </a:spcBef>
+              <a:buClr>
+                <a:srgbClr val="C00000"/>
+              </a:buClr>
+              <a:buSzPts val="2100"/>
+              <a:buFont typeface="Arial" panose="020B0604020202020204" pitchFamily="34" charset="0"/>
+              <a:buChar char="•"/>
+            </a:pPr>
+            <a:r>
+              <a:rPr lang="en-US" sz="3600" dirty="0">
+                <a:solidFill>
+                  <a:srgbClr val="C00000"/>
+                </a:solidFill>
+                <a:latin typeface="Pragmatica" panose="020B0403040502020204"/>
+                <a:sym typeface="Consolas"/>
+              </a:rPr>
+              <a:t>Check mpg-dashboard-prompt.txt for a sample input prompt</a:t>
+            </a:r>
+          </a:p>
+          <a:p>
+            <a:pPr marL="714375" indent="-571500">
+              <a:lnSpc>
+                <a:spcPct val="115000"/>
+              </a:lnSpc>
+              <a:spcBef>
+                <a:spcPts val="1125"/>
+              </a:spcBef>
+              <a:buClr>
+                <a:srgbClr val="C00000"/>
+              </a:buClr>
+              <a:buSzPts val="2100"/>
+              <a:buFont typeface="Arial" panose="020B0604020202020204" pitchFamily="34" charset="0"/>
+              <a:buChar char="•"/>
+            </a:pPr>
+            <a:r>
+              <a:rPr lang="en-US" sz="3600" dirty="0">
+                <a:solidFill>
+                  <a:srgbClr val="C00000"/>
+                </a:solidFill>
+                <a:latin typeface="Pragmatica" panose="020B0403040502020204"/>
+                <a:sym typeface="Consolas"/>
+              </a:rPr>
+              <a:t>We’ll walk through assembling the dashboard together</a:t>
+            </a:r>
+          </a:p>
+          <a:p>
+            <a:pPr marL="714375" indent="-571500">
+              <a:lnSpc>
+                <a:spcPct val="115000"/>
+              </a:lnSpc>
+              <a:spcBef>
+                <a:spcPts val="1125"/>
+              </a:spcBef>
+              <a:buClr>
+                <a:srgbClr val="C00000"/>
+              </a:buClr>
+              <a:buSzPts val="2100"/>
+              <a:buFont typeface="Arial" panose="020B0604020202020204" pitchFamily="34" charset="0"/>
+              <a:buChar char="•"/>
+            </a:pPr>
+            <a:r>
+              <a:rPr lang="en-US" sz="3600" dirty="0">
+                <a:solidFill>
+                  <a:srgbClr val="C00000"/>
+                </a:solidFill>
+                <a:latin typeface="Pragmatica" panose="020B0403040502020204"/>
+                <a:sym typeface="Consolas"/>
+              </a:rPr>
+              <a:t>Your results will vary from mine… embrace it!</a:t>
+            </a:r>
+          </a:p>
+          <a:p>
+            <a:endParaRPr lang="en-US" sz="6000" dirty="0">
+              <a:solidFill>
+                <a:srgbClr val="CF3338"/>
+              </a:solidFill>
+              <a:latin typeface="Pragmatica" panose="020B0403040502020204" pitchFamily="34" charset="0"/>
+            </a:endParaRPr>
+          </a:p>
+        </p:txBody>
+      </p:sp>
+    </p:spTree>
+    <p:extLst>
+      <p:ext uri="{BB962C8B-B14F-4D97-AF65-F5344CB8AC3E}">
+        <p14:creationId xmlns:p14="http://schemas.microsoft.com/office/powerpoint/2010/main" val="1152180219"/>
+      </p:ext>
+    </p:extLst>
+  </p:cSld>
+  <p:clrMapOvr>
+    <a:masterClrMapping/>
+  </p:clrMapOvr>
+</p:sld>
+</file>
+
+<file path=ppt/slides/slide11.xml><?xml version="1.0" encoding="utf-8"?>
+<p:sld xmlns:a="http://schemas.openxmlformats.org/drawingml/2006/main" xmlns:r="http://schemas.openxmlformats.org/officeDocument/2006/relationships" xmlns:p="http://schemas.openxmlformats.org/presentationml/2006/main">
+  <p:cSld>
+    <p:spTree>
+      <p:nvGrpSpPr>
         <p:cNvPr id="1" name=""/>
         <p:cNvGrpSpPr/>
         <p:nvPr/>
@@ -5020,7 +5475,7 @@
 </p:sld>
 </file>
 
-<file path=ppt/slides/slide11.xml><?xml version="1.0" encoding="utf-8"?>
+<file path=ppt/slides/slide12.xml><?xml version="1.0" encoding="utf-8"?>
 <p:sld xmlns:a="http://schemas.openxmlformats.org/drawingml/2006/main" xmlns:r="http://schemas.openxmlformats.org/officeDocument/2006/relationships" xmlns:p="http://schemas.openxmlformats.org/presentationml/2006/main">
   <p:cSld>
     <p:spTree>
@@ -5130,7 +5585,7 @@
 </p:sld>
 </file>
 
-<file path=ppt/slides/slide12.xml><?xml version="1.0" encoding="utf-8"?>
+<file path=ppt/slides/slide13.xml><?xml version="1.0" encoding="utf-8"?>
 <p:sld xmlns:a="http://schemas.openxmlformats.org/drawingml/2006/main" xmlns:r="http://schemas.openxmlformats.org/officeDocument/2006/relationships" xmlns:p="http://schemas.openxmlformats.org/presentationml/2006/main">
   <p:cSld>
     <p:spTree>
@@ -5408,7 +5863,7 @@
 </p:sld>
 </file>
 
-<file path=ppt/slides/slide13.xml><?xml version="1.0" encoding="utf-8"?>
+<file path=ppt/slides/slide14.xml><?xml version="1.0" encoding="utf-8"?>
 <p:sld xmlns:a="http://schemas.openxmlformats.org/drawingml/2006/main" xmlns:r="http://schemas.openxmlformats.org/officeDocument/2006/relationships" xmlns:p="http://schemas.openxmlformats.org/presentationml/2006/main">
   <p:cSld>
     <p:spTree>
@@ -5736,7 +6191,7 @@
 </p:sld>
 </file>
 
-<file path=ppt/slides/slide14.xml><?xml version="1.0" encoding="utf-8"?>
+<file path=ppt/slides/slide15.xml><?xml version="1.0" encoding="utf-8"?>
 <p:sld xmlns:a="http://schemas.openxmlformats.org/drawingml/2006/main" xmlns:r="http://schemas.openxmlformats.org/officeDocument/2006/relationships" xmlns:p="http://schemas.openxmlformats.org/presentationml/2006/main">
   <p:cSld>
     <p:spTree>
@@ -6038,7 +6493,7 @@
 </p:sld>
 </file>
 
-<file path=ppt/slides/slide15.xml><?xml version="1.0" encoding="utf-8"?>
+<file path=ppt/slides/slide16.xml><?xml version="1.0" encoding="utf-8"?>
 <p:sld xmlns:a="http://schemas.openxmlformats.org/drawingml/2006/main" xmlns:r="http://schemas.openxmlformats.org/officeDocument/2006/relationships" xmlns:p="http://schemas.openxmlformats.org/presentationml/2006/main">
   <p:cSld>
     <p:spTree>
@@ -6331,7 +6786,7 @@
 </p:sld>
 </file>
 
-<file path=ppt/slides/slide16.xml><?xml version="1.0" encoding="utf-8"?>
+<file path=ppt/slides/slide17.xml><?xml version="1.0" encoding="utf-8"?>
 <p:sld xmlns:a="http://schemas.openxmlformats.org/drawingml/2006/main" xmlns:r="http://schemas.openxmlformats.org/officeDocument/2006/relationships" xmlns:p="http://schemas.openxmlformats.org/presentationml/2006/main">
   <p:cSld>
     <p:spTree>
@@ -6513,7 +6968,7 @@
 </p:sld>
 </file>
 
-<file path=ppt/slides/slide17.xml><?xml version="1.0" encoding="utf-8"?>
+<file path=ppt/slides/slide18.xml><?xml version="1.0" encoding="utf-8"?>
 <p:sld xmlns:a="http://schemas.openxmlformats.org/drawingml/2006/main" xmlns:r="http://schemas.openxmlformats.org/officeDocument/2006/relationships" xmlns:p="http://schemas.openxmlformats.org/presentationml/2006/main">
   <p:cSld>
     <p:spTree>
@@ -6641,7 +7096,7 @@
 </p:sld>
 </file>
 
-<file path=ppt/slides/slide18.xml><?xml version="1.0" encoding="utf-8"?>
+<file path=ppt/slides/slide19.xml><?xml version="1.0" encoding="utf-8"?>
 <p:sld xmlns:a="http://schemas.openxmlformats.org/drawingml/2006/main" xmlns:r="http://schemas.openxmlformats.org/officeDocument/2006/relationships" xmlns:p="http://schemas.openxmlformats.org/presentationml/2006/main">
   <p:cSld>
     <p:spTree>
@@ -6941,319 +7396,6 @@
     <p:extLst>
       <p:ext uri="{BB962C8B-B14F-4D97-AF65-F5344CB8AC3E}">
         <p14:creationId xmlns:p14="http://schemas.microsoft.com/office/powerpoint/2010/main" val="3435722049"/>
-      </p:ext>
-    </p:extLst>
-  </p:cSld>
-  <p:clrMapOvr>
-    <a:masterClrMapping/>
-  </p:clrMapOvr>
-</p:sld>
-</file>
-
-<file path=ppt/slides/slide19.xml><?xml version="1.0" encoding="utf-8"?>
-<p:sld xmlns:a="http://schemas.openxmlformats.org/drawingml/2006/main" xmlns:r="http://schemas.openxmlformats.org/officeDocument/2006/relationships" xmlns:p="http://schemas.openxmlformats.org/presentationml/2006/main">
-  <p:cSld>
-    <p:spTree>
-      <p:nvGrpSpPr>
-        <p:cNvPr id="1" name="">
-          <a:extLst>
-            <a:ext uri="{FF2B5EF4-FFF2-40B4-BE49-F238E27FC236}">
-              <a16:creationId xmlns:a16="http://schemas.microsoft.com/office/drawing/2014/main" id="{8C48D4C6-B9FA-7672-C04D-8197E0C63666}"/>
-            </a:ext>
-          </a:extLst>
-        </p:cNvPr>
-        <p:cNvGrpSpPr/>
-        <p:nvPr/>
-      </p:nvGrpSpPr>
-      <p:grpSpPr>
-        <a:xfrm>
-          <a:off x="0" y="0"/>
-          <a:ext cx="0" cy="0"/>
-          <a:chOff x="0" y="0"/>
-          <a:chExt cx="0" cy="0"/>
-        </a:xfrm>
-      </p:grpSpPr>
-      <p:sp>
-        <p:nvSpPr>
-          <p:cNvPr id="4" name="Rectangle 3">
-            <a:extLst>
-              <a:ext uri="{FF2B5EF4-FFF2-40B4-BE49-F238E27FC236}">
-                <a16:creationId xmlns:a16="http://schemas.microsoft.com/office/drawing/2014/main" id="{E4A882A5-11FC-4C29-C4E0-4E178992806D}"/>
-              </a:ext>
-            </a:extLst>
-          </p:cNvPr>
-          <p:cNvSpPr/>
-          <p:nvPr/>
-        </p:nvSpPr>
-        <p:spPr>
-          <a:xfrm>
-            <a:off x="13639800" y="0"/>
-            <a:ext cx="4648200" cy="10287000"/>
-          </a:xfrm>
-          <a:prstGeom prst="rect">
-            <a:avLst/>
-          </a:prstGeom>
-          <a:solidFill>
-            <a:srgbClr val="CF3338"/>
-          </a:solidFill>
-          <a:ln>
-            <a:noFill/>
-          </a:ln>
-        </p:spPr>
-        <p:style>
-          <a:lnRef idx="2">
-            <a:schemeClr val="accent1">
-              <a:shade val="50000"/>
-            </a:schemeClr>
-          </a:lnRef>
-          <a:fillRef idx="1">
-            <a:schemeClr val="accent1"/>
-          </a:fillRef>
-          <a:effectRef idx="0">
-            <a:schemeClr val="accent1"/>
-          </a:effectRef>
-          <a:fontRef idx="minor">
-            <a:schemeClr val="lt1"/>
-          </a:fontRef>
-        </p:style>
-        <p:txBody>
-          <a:bodyPr rtlCol="0" anchor="ctr"/>
-          <a:lstStyle/>
-          <a:p>
-            <a:pPr algn="ctr"/>
-            <a:endParaRPr lang="en-US" sz="2700"/>
-          </a:p>
-        </p:txBody>
-      </p:sp>
-      <p:pic>
-        <p:nvPicPr>
-          <p:cNvPr id="2" name="Picture 1">
-            <a:extLst>
-              <a:ext uri="{FF2B5EF4-FFF2-40B4-BE49-F238E27FC236}">
-                <a16:creationId xmlns:a16="http://schemas.microsoft.com/office/drawing/2014/main" id="{0BD9C0FB-1716-0FB1-A6C3-7BF95597E59E}"/>
-              </a:ext>
-            </a:extLst>
-          </p:cNvPr>
-          <p:cNvPicPr>
-            <a:picLocks noChangeAspect="1"/>
-          </p:cNvPicPr>
-          <p:nvPr/>
-        </p:nvPicPr>
-        <p:blipFill rotWithShape="1">
-          <a:blip r:embed="rId3">
-            <a:extLst>
-              <a:ext uri="{28A0092B-C50C-407E-A947-70E740481C1C}">
-                <a14:useLocalDpi xmlns:a14="http://schemas.microsoft.com/office/drawing/2010/main" val="0"/>
-              </a:ext>
-            </a:extLst>
-          </a:blip>
-          <a:srcRect l="69227" t="33418" r="20112" b="50548"/>
-          <a:stretch/>
-        </p:blipFill>
-        <p:spPr>
-          <a:xfrm>
-            <a:off x="15579524" y="7544693"/>
-            <a:ext cx="2708477" cy="2987579"/>
-          </a:xfrm>
-          <a:prstGeom prst="rect">
-            <a:avLst/>
-          </a:prstGeom>
-        </p:spPr>
-      </p:pic>
-      <p:sp>
-        <p:nvSpPr>
-          <p:cNvPr id="3" name="TextBox 2">
-            <a:extLst>
-              <a:ext uri="{FF2B5EF4-FFF2-40B4-BE49-F238E27FC236}">
-                <a16:creationId xmlns:a16="http://schemas.microsoft.com/office/drawing/2014/main" id="{06E31731-9E14-75BD-E6F9-954AD4E559FB}"/>
-              </a:ext>
-            </a:extLst>
-          </p:cNvPr>
-          <p:cNvSpPr txBox="1"/>
-          <p:nvPr/>
-        </p:nvSpPr>
-        <p:spPr>
-          <a:xfrm>
-            <a:off x="260431" y="329879"/>
-            <a:ext cx="9035970" cy="8391528"/>
-          </a:xfrm>
-          <a:prstGeom prst="rect">
-            <a:avLst/>
-          </a:prstGeom>
-          <a:noFill/>
-        </p:spPr>
-        <p:txBody>
-          <a:bodyPr wrap="square" rtlCol="0">
-            <a:spAutoFit/>
-          </a:bodyPr>
-          <a:lstStyle/>
-          <a:p>
-            <a:r>
-              <a:rPr lang="en-US" sz="6000" b="1" dirty="0">
-                <a:solidFill>
-                  <a:srgbClr val="CF3338"/>
-                </a:solidFill>
-                <a:latin typeface="Pragmatica" panose="020B0403040502020204" pitchFamily="34" charset="0"/>
-              </a:rPr>
-              <a:t>Cross-checking AI-Powered Excel</a:t>
-            </a:r>
-          </a:p>
-          <a:p>
-            <a:endParaRPr lang="en-US" sz="4200" dirty="0">
-              <a:solidFill>
-                <a:srgbClr val="CF3338"/>
-              </a:solidFill>
-              <a:latin typeface="Pragmatica" panose="020B0403040502020204" pitchFamily="34" charset="0"/>
-            </a:endParaRPr>
-          </a:p>
-          <a:p>
-            <a:pPr marL="714375" indent="-571500">
-              <a:lnSpc>
-                <a:spcPct val="115000"/>
-              </a:lnSpc>
-              <a:spcBef>
-                <a:spcPts val="1125"/>
-              </a:spcBef>
-              <a:buClr>
-                <a:srgbClr val="C00000"/>
-              </a:buClr>
-              <a:buSzPts val="2100"/>
-              <a:buFont typeface="Arial" panose="020B0604020202020204" pitchFamily="34" charset="0"/>
-              <a:buChar char="•"/>
-            </a:pPr>
-            <a:r>
-              <a:rPr lang="en-US" sz="3600" dirty="0">
-                <a:solidFill>
-                  <a:srgbClr val="C00000"/>
-                </a:solidFill>
-                <a:latin typeface="Pragmatica" panose="020B0403040502020204"/>
-                <a:sym typeface="Consolas"/>
-              </a:rPr>
-              <a:t>What processes can we follow to safeguard and cross-check our Python-Copilot-Excel workflow? </a:t>
-            </a:r>
-          </a:p>
-          <a:p>
-            <a:pPr marL="714375" indent="-571500">
-              <a:lnSpc>
-                <a:spcPct val="115000"/>
-              </a:lnSpc>
-              <a:spcBef>
-                <a:spcPts val="1125"/>
-              </a:spcBef>
-              <a:buClr>
-                <a:srgbClr val="C00000"/>
-              </a:buClr>
-              <a:buSzPts val="2100"/>
-              <a:buFont typeface="Arial" panose="020B0604020202020204" pitchFamily="34" charset="0"/>
-              <a:buChar char="•"/>
-            </a:pPr>
-            <a:r>
-              <a:rPr lang="en-US" sz="3600" dirty="0">
-                <a:solidFill>
-                  <a:srgbClr val="C00000"/>
-                </a:solidFill>
-                <a:latin typeface="Pragmatica" panose="020B0403040502020204"/>
-                <a:sym typeface="Consolas"/>
-              </a:rPr>
-              <a:t>Resource: </a:t>
-            </a:r>
-            <a:r>
-              <a:rPr lang="en-US" sz="3600" dirty="0">
-                <a:solidFill>
-                  <a:srgbClr val="C00000"/>
-                </a:solidFill>
-                <a:latin typeface="Pragmatica" panose="020B0403040502020204"/>
-                <a:sym typeface="Consolas"/>
-                <a:hlinkClick r:id="rId4">
-                  <a:extLst>
-                    <a:ext uri="{A12FA001-AC4F-418D-AE19-62706E023703}">
-                      <ahyp:hlinkClr xmlns:ahyp="http://schemas.microsoft.com/office/drawing/2018/hyperlinkcolor" val="tx"/>
-                    </a:ext>
-                  </a:extLst>
-                </a:hlinkClick>
-              </a:rPr>
-              <a:t>https://stringfestanalytics.com/how-to-cross-check-ai-generated-insights-in-excel/</a:t>
-            </a:r>
-            <a:r>
-              <a:rPr lang="en-US" sz="3600" dirty="0">
-                <a:solidFill>
-                  <a:srgbClr val="C00000"/>
-                </a:solidFill>
-                <a:latin typeface="Pragmatica" panose="020B0403040502020204"/>
-                <a:sym typeface="Consolas"/>
-              </a:rPr>
-              <a:t> </a:t>
-            </a:r>
-          </a:p>
-          <a:p>
-            <a:pPr marL="1171575" lvl="1" indent="-571500">
-              <a:lnSpc>
-                <a:spcPct val="115000"/>
-              </a:lnSpc>
-              <a:spcBef>
-                <a:spcPts val="1125"/>
-              </a:spcBef>
-              <a:buClr>
-                <a:srgbClr val="C00000"/>
-              </a:buClr>
-              <a:buSzPts val="2100"/>
-              <a:buFont typeface="Arial" panose="020B0604020202020204" pitchFamily="34" charset="0"/>
-              <a:buChar char="•"/>
-            </a:pPr>
-            <a:r>
-              <a:rPr lang="en-US" sz="3600" dirty="0">
-                <a:solidFill>
-                  <a:srgbClr val="C00000"/>
-                </a:solidFill>
-                <a:latin typeface="Pragmatica" panose="020B0403040502020204"/>
-                <a:sym typeface="Consolas"/>
-              </a:rPr>
-              <a:t>“Treat AI like an intern” </a:t>
-            </a:r>
-          </a:p>
-          <a:p>
-            <a:endParaRPr lang="en-US" sz="6000" dirty="0">
-              <a:solidFill>
-                <a:srgbClr val="CF3338"/>
-              </a:solidFill>
-              <a:latin typeface="Pragmatica" panose="020B0403040502020204" pitchFamily="34" charset="0"/>
-            </a:endParaRPr>
-          </a:p>
-        </p:txBody>
-      </p:sp>
-      <p:pic>
-        <p:nvPicPr>
-          <p:cNvPr id="5" name="Picture 4" descr="A person with a blue mask&#10;&#10;AI-generated content may be incorrect.">
-            <a:extLst>
-              <a:ext uri="{FF2B5EF4-FFF2-40B4-BE49-F238E27FC236}">
-                <a16:creationId xmlns:a16="http://schemas.microsoft.com/office/drawing/2014/main" id="{3A0F90B0-E13D-877C-1E91-A7BA2E51A4DD}"/>
-              </a:ext>
-            </a:extLst>
-          </p:cNvPr>
-          <p:cNvPicPr>
-            <a:picLocks noChangeAspect="1"/>
-          </p:cNvPicPr>
-          <p:nvPr/>
-        </p:nvPicPr>
-        <p:blipFill>
-          <a:blip r:embed="rId5"/>
-          <a:srcRect l="25704" r="29233" b="8030"/>
-          <a:stretch/>
-        </p:blipFill>
-        <p:spPr>
-          <a:xfrm>
-            <a:off x="9982200" y="571500"/>
-            <a:ext cx="4152900" cy="8475789"/>
-          </a:xfrm>
-          <a:prstGeom prst="rect">
-            <a:avLst/>
-          </a:prstGeom>
-        </p:spPr>
-      </p:pic>
-    </p:spTree>
-    <p:extLst>
-      <p:ext uri="{BB962C8B-B14F-4D97-AF65-F5344CB8AC3E}">
-        <p14:creationId xmlns:p14="http://schemas.microsoft.com/office/powerpoint/2010/main" val="3903585909"/>
       </p:ext>
     </p:extLst>
   </p:cSld>
@@ -7450,7 +7592,13 @@
   <p:cSld>
     <p:spTree>
       <p:nvGrpSpPr>
-        <p:cNvPr id="1" name=""/>
+        <p:cNvPr id="1" name="">
+          <a:extLst>
+            <a:ext uri="{FF2B5EF4-FFF2-40B4-BE49-F238E27FC236}">
+              <a16:creationId xmlns:a16="http://schemas.microsoft.com/office/drawing/2014/main" id="{8C48D4C6-B9FA-7672-C04D-8197E0C63666}"/>
+            </a:ext>
+          </a:extLst>
+        </p:cNvPr>
         <p:cNvGrpSpPr/>
         <p:nvPr/>
       </p:nvGrpSpPr>
@@ -7462,44 +7610,73 @@
           <a:chExt cx="0" cy="0"/>
         </a:xfrm>
       </p:grpSpPr>
+      <p:sp>
+        <p:nvSpPr>
+          <p:cNvPr id="4" name="Rectangle 3">
+            <a:extLst>
+              <a:ext uri="{FF2B5EF4-FFF2-40B4-BE49-F238E27FC236}">
+                <a16:creationId xmlns:a16="http://schemas.microsoft.com/office/drawing/2014/main" id="{E4A882A5-11FC-4C29-C4E0-4E178992806D}"/>
+              </a:ext>
+            </a:extLst>
+          </p:cNvPr>
+          <p:cNvSpPr/>
+          <p:nvPr/>
+        </p:nvSpPr>
+        <p:spPr>
+          <a:xfrm>
+            <a:off x="13639800" y="0"/>
+            <a:ext cx="4648200" cy="10287000"/>
+          </a:xfrm>
+          <a:prstGeom prst="rect">
+            <a:avLst/>
+          </a:prstGeom>
+          <a:solidFill>
+            <a:srgbClr val="CF3338"/>
+          </a:solidFill>
+          <a:ln>
+            <a:noFill/>
+          </a:ln>
+        </p:spPr>
+        <p:style>
+          <a:lnRef idx="2">
+            <a:schemeClr val="accent1">
+              <a:shade val="50000"/>
+            </a:schemeClr>
+          </a:lnRef>
+          <a:fillRef idx="1">
+            <a:schemeClr val="accent1"/>
+          </a:fillRef>
+          <a:effectRef idx="0">
+            <a:schemeClr val="accent1"/>
+          </a:effectRef>
+          <a:fontRef idx="minor">
+            <a:schemeClr val="lt1"/>
+          </a:fontRef>
+        </p:style>
+        <p:txBody>
+          <a:bodyPr rtlCol="0" anchor="ctr"/>
+          <a:lstStyle/>
+          <a:p>
+            <a:pPr algn="ctr"/>
+            <a:endParaRPr lang="en-US" sz="2700"/>
+          </a:p>
+        </p:txBody>
+      </p:sp>
       <p:pic>
         <p:nvPicPr>
-          <p:cNvPr id="10" name="Picture 9"/>
+          <p:cNvPr id="2" name="Picture 1">
+            <a:extLst>
+              <a:ext uri="{FF2B5EF4-FFF2-40B4-BE49-F238E27FC236}">
+                <a16:creationId xmlns:a16="http://schemas.microsoft.com/office/drawing/2014/main" id="{0BD9C0FB-1716-0FB1-A6C3-7BF95597E59E}"/>
+              </a:ext>
+            </a:extLst>
+          </p:cNvPr>
           <p:cNvPicPr>
             <a:picLocks noChangeAspect="1"/>
           </p:cNvPicPr>
           <p:nvPr/>
         </p:nvPicPr>
         <p:blipFill rotWithShape="1">
-          <a:blip r:embed="rId2">
-            <a:extLst>
-              <a:ext uri="{28A0092B-C50C-407E-A947-70E740481C1C}">
-                <a14:useLocalDpi xmlns:a14="http://schemas.microsoft.com/office/drawing/2010/main" val="0"/>
-              </a:ext>
-            </a:extLst>
-          </a:blip>
-          <a:srcRect l="50728" t="56371"/>
-          <a:stretch/>
-        </p:blipFill>
-        <p:spPr>
-          <a:xfrm>
-            <a:off x="12204691" y="3316148"/>
-            <a:ext cx="6083309" cy="6970854"/>
-          </a:xfrm>
-          <a:prstGeom prst="rect">
-            <a:avLst/>
-          </a:prstGeom>
-        </p:spPr>
-      </p:pic>
-      <p:pic>
-        <p:nvPicPr>
-          <p:cNvPr id="4" name="Picture 3"/>
-          <p:cNvPicPr>
-            <a:picLocks noChangeAspect="1"/>
-          </p:cNvPicPr>
-          <p:nvPr/>
-        </p:nvPicPr>
-        <p:blipFill>
           <a:blip r:embed="rId3">
             <a:extLst>
               <a:ext uri="{28A0092B-C50C-407E-A947-70E740481C1C}">
@@ -7507,14 +7684,13 @@
               </a:ext>
             </a:extLst>
           </a:blip>
-          <a:stretch>
-            <a:fillRect/>
-          </a:stretch>
+          <a:srcRect l="69227" t="33418" r="20112" b="50548"/>
+          <a:stretch/>
         </p:blipFill>
         <p:spPr>
           <a:xfrm>
-            <a:off x="-807744" y="-3724155"/>
-            <a:ext cx="15257208" cy="11189825"/>
+            <a:off x="15579524" y="7544693"/>
+            <a:ext cx="2708477" cy="2987579"/>
           </a:xfrm>
           <a:prstGeom prst="rect">
             <a:avLst/>
@@ -7523,14 +7699,20 @@
       </p:pic>
       <p:sp>
         <p:nvSpPr>
-          <p:cNvPr id="11" name="TextBox 10"/>
+          <p:cNvPr id="3" name="TextBox 2">
+            <a:extLst>
+              <a:ext uri="{FF2B5EF4-FFF2-40B4-BE49-F238E27FC236}">
+                <a16:creationId xmlns:a16="http://schemas.microsoft.com/office/drawing/2014/main" id="{06E31731-9E14-75BD-E6F9-954AD4E559FB}"/>
+              </a:ext>
+            </a:extLst>
+          </p:cNvPr>
           <p:cNvSpPr txBox="1"/>
           <p:nvPr/>
         </p:nvSpPr>
         <p:spPr>
           <a:xfrm>
-            <a:off x="486137" y="2531318"/>
-            <a:ext cx="11979797" cy="923330"/>
+            <a:off x="260431" y="329879"/>
+            <a:ext cx="9035970" cy="8391528"/>
           </a:xfrm>
           <a:prstGeom prst="rect">
             <a:avLst/>
@@ -7544,23 +7726,144 @@
           <a:lstStyle/>
           <a:p>
             <a:r>
-              <a:rPr lang="en-US" sz="5400" b="1" dirty="0">
+              <a:rPr lang="en-US" sz="6000" b="1" dirty="0">
                 <a:solidFill>
                   <a:srgbClr val="CF3338"/>
                 </a:solidFill>
                 <a:latin typeface="Pragmatica" panose="020B0403040502020204" pitchFamily="34" charset="0"/>
               </a:rPr>
-              <a:t>Questions?</a:t>
-            </a:r>
+              <a:t>Cross-checking AI-Powered Excel</a:t>
+            </a:r>
+          </a:p>
+          <a:p>
+            <a:endParaRPr lang="en-US" sz="4200" dirty="0">
+              <a:solidFill>
+                <a:srgbClr val="CF3338"/>
+              </a:solidFill>
+              <a:latin typeface="Pragmatica" panose="020B0403040502020204" pitchFamily="34" charset="0"/>
+            </a:endParaRPr>
+          </a:p>
+          <a:p>
+            <a:pPr marL="714375" indent="-571500">
+              <a:lnSpc>
+                <a:spcPct val="115000"/>
+              </a:lnSpc>
+              <a:spcBef>
+                <a:spcPts val="1125"/>
+              </a:spcBef>
+              <a:buClr>
+                <a:srgbClr val="C00000"/>
+              </a:buClr>
+              <a:buSzPts val="2100"/>
+              <a:buFont typeface="Arial" panose="020B0604020202020204" pitchFamily="34" charset="0"/>
+              <a:buChar char="•"/>
+            </a:pPr>
+            <a:r>
+              <a:rPr lang="en-US" sz="3600" dirty="0">
+                <a:solidFill>
+                  <a:srgbClr val="C00000"/>
+                </a:solidFill>
+                <a:latin typeface="Pragmatica" panose="020B0403040502020204"/>
+                <a:sym typeface="Consolas"/>
+              </a:rPr>
+              <a:t>What processes can we follow to safeguard and cross-check our Python-Copilot-Excel workflow? </a:t>
+            </a:r>
+          </a:p>
+          <a:p>
+            <a:pPr marL="714375" indent="-571500">
+              <a:lnSpc>
+                <a:spcPct val="115000"/>
+              </a:lnSpc>
+              <a:spcBef>
+                <a:spcPts val="1125"/>
+              </a:spcBef>
+              <a:buClr>
+                <a:srgbClr val="C00000"/>
+              </a:buClr>
+              <a:buSzPts val="2100"/>
+              <a:buFont typeface="Arial" panose="020B0604020202020204" pitchFamily="34" charset="0"/>
+              <a:buChar char="•"/>
+            </a:pPr>
+            <a:r>
+              <a:rPr lang="en-US" sz="3600" dirty="0">
+                <a:solidFill>
+                  <a:srgbClr val="C00000"/>
+                </a:solidFill>
+                <a:latin typeface="Pragmatica" panose="020B0403040502020204"/>
+                <a:sym typeface="Consolas"/>
+              </a:rPr>
+              <a:t>Resource: </a:t>
+            </a:r>
+            <a:r>
+              <a:rPr lang="en-US" sz="3600" dirty="0">
+                <a:solidFill>
+                  <a:srgbClr val="C00000"/>
+                </a:solidFill>
+                <a:latin typeface="Pragmatica" panose="020B0403040502020204"/>
+                <a:sym typeface="Consolas"/>
+                <a:hlinkClick r:id="rId4">
+                  <a:extLst>
+                    <a:ext uri="{A12FA001-AC4F-418D-AE19-62706E023703}">
+                      <ahyp:hlinkClr xmlns:ahyp="http://schemas.microsoft.com/office/drawing/2018/hyperlinkcolor" val="tx"/>
+                    </a:ext>
+                  </a:extLst>
+                </a:hlinkClick>
+              </a:rPr>
+              <a:t>https://stringfestanalytics.com/how-to-cross-check-ai-generated-insights-in-excel/</a:t>
+            </a:r>
+            <a:r>
+              <a:rPr lang="en-US" sz="3600" dirty="0">
+                <a:solidFill>
+                  <a:srgbClr val="C00000"/>
+                </a:solidFill>
+                <a:latin typeface="Pragmatica" panose="020B0403040502020204"/>
+                <a:sym typeface="Consolas"/>
+              </a:rPr>
+              <a:t> </a:t>
+            </a:r>
+          </a:p>
+          <a:p>
+            <a:pPr marL="1171575" lvl="1" indent="-571500">
+              <a:lnSpc>
+                <a:spcPct val="115000"/>
+              </a:lnSpc>
+              <a:spcBef>
+                <a:spcPts val="1125"/>
+              </a:spcBef>
+              <a:buClr>
+                <a:srgbClr val="C00000"/>
+              </a:buClr>
+              <a:buSzPts val="2100"/>
+              <a:buFont typeface="Arial" panose="020B0604020202020204" pitchFamily="34" charset="0"/>
+              <a:buChar char="•"/>
+            </a:pPr>
+            <a:r>
+              <a:rPr lang="en-US" sz="3600" dirty="0">
+                <a:solidFill>
+                  <a:srgbClr val="C00000"/>
+                </a:solidFill>
+                <a:latin typeface="Pragmatica" panose="020B0403040502020204"/>
+                <a:sym typeface="Consolas"/>
+              </a:rPr>
+              <a:t>“Treat AI like an intern” </a:t>
+            </a:r>
+          </a:p>
+          <a:p>
+            <a:endParaRPr lang="en-US" sz="6000" dirty="0">
+              <a:solidFill>
+                <a:srgbClr val="CF3338"/>
+              </a:solidFill>
+              <a:latin typeface="Pragmatica" panose="020B0403040502020204" pitchFamily="34" charset="0"/>
+            </a:endParaRPr>
           </a:p>
         </p:txBody>
       </p:sp>
       <p:pic>
         <p:nvPicPr>
-          <p:cNvPr id="5" name="Picture 4">
+          <p:cNvPr id="5" name="Picture 4" descr="A person with a blue mask&#10;&#10;AI-generated content may be incorrect.">
             <a:extLst>
               <a:ext uri="{FF2B5EF4-FFF2-40B4-BE49-F238E27FC236}">
-                <a16:creationId xmlns:a16="http://schemas.microsoft.com/office/drawing/2014/main" id="{54A06221-5316-4BCF-9FDA-BDB95FF4A778}"/>
+                <a16:creationId xmlns:a16="http://schemas.microsoft.com/office/drawing/2014/main" id="{3A0F90B0-E13D-877C-1E91-A7BA2E51A4DD}"/>
               </a:ext>
             </a:extLst>
           </p:cNvPr>
@@ -7570,20 +7873,14 @@
           <p:nvPr/>
         </p:nvPicPr>
         <p:blipFill>
-          <a:blip r:embed="rId4">
-            <a:extLst>
-              <a:ext uri="{28A0092B-C50C-407E-A947-70E740481C1C}">
-                <a14:useLocalDpi xmlns:a14="http://schemas.microsoft.com/office/drawing/2010/main" val="0"/>
-              </a:ext>
-            </a:extLst>
-          </a:blip>
-          <a:srcRect/>
+          <a:blip r:embed="rId5"/>
+          <a:srcRect l="25704" r="29233" b="8030"/>
           <a:stretch/>
         </p:blipFill>
         <p:spPr>
           <a:xfrm>
-            <a:off x="12204691" y="3317239"/>
-            <a:ext cx="6083309" cy="6968672"/>
+            <a:off x="9982200" y="571500"/>
+            <a:ext cx="4152900" cy="8475789"/>
           </a:xfrm>
           <a:prstGeom prst="rect">
             <a:avLst/>
@@ -7593,7 +7890,7 @@
     </p:spTree>
     <p:extLst>
       <p:ext uri="{BB962C8B-B14F-4D97-AF65-F5344CB8AC3E}">
-        <p14:creationId xmlns:p14="http://schemas.microsoft.com/office/powerpoint/2010/main" val="2899625024"/>
+        <p14:creationId xmlns:p14="http://schemas.microsoft.com/office/powerpoint/2010/main" val="3903585909"/>
       </p:ext>
     </p:extLst>
   </p:cSld>
@@ -7688,6 +7985,164 @@
         <p:spPr>
           <a:xfrm>
             <a:off x="486137" y="2531318"/>
+            <a:ext cx="11979797" cy="923330"/>
+          </a:xfrm>
+          <a:prstGeom prst="rect">
+            <a:avLst/>
+          </a:prstGeom>
+          <a:noFill/>
+        </p:spPr>
+        <p:txBody>
+          <a:bodyPr wrap="square" rtlCol="0">
+            <a:spAutoFit/>
+          </a:bodyPr>
+          <a:lstStyle/>
+          <a:p>
+            <a:r>
+              <a:rPr lang="en-US" sz="5400" b="1" dirty="0">
+                <a:solidFill>
+                  <a:srgbClr val="CF3338"/>
+                </a:solidFill>
+                <a:latin typeface="Pragmatica" panose="020B0403040502020204" pitchFamily="34" charset="0"/>
+              </a:rPr>
+              <a:t>Questions?</a:t>
+            </a:r>
+          </a:p>
+        </p:txBody>
+      </p:sp>
+      <p:pic>
+        <p:nvPicPr>
+          <p:cNvPr id="5" name="Picture 4">
+            <a:extLst>
+              <a:ext uri="{FF2B5EF4-FFF2-40B4-BE49-F238E27FC236}">
+                <a16:creationId xmlns:a16="http://schemas.microsoft.com/office/drawing/2014/main" id="{54A06221-5316-4BCF-9FDA-BDB95FF4A778}"/>
+              </a:ext>
+            </a:extLst>
+          </p:cNvPr>
+          <p:cNvPicPr>
+            <a:picLocks noChangeAspect="1"/>
+          </p:cNvPicPr>
+          <p:nvPr/>
+        </p:nvPicPr>
+        <p:blipFill>
+          <a:blip r:embed="rId4">
+            <a:extLst>
+              <a:ext uri="{28A0092B-C50C-407E-A947-70E740481C1C}">
+                <a14:useLocalDpi xmlns:a14="http://schemas.microsoft.com/office/drawing/2010/main" val="0"/>
+              </a:ext>
+            </a:extLst>
+          </a:blip>
+          <a:srcRect/>
+          <a:stretch/>
+        </p:blipFill>
+        <p:spPr>
+          <a:xfrm>
+            <a:off x="12204691" y="3317239"/>
+            <a:ext cx="6083309" cy="6968672"/>
+          </a:xfrm>
+          <a:prstGeom prst="rect">
+            <a:avLst/>
+          </a:prstGeom>
+        </p:spPr>
+      </p:pic>
+    </p:spTree>
+    <p:extLst>
+      <p:ext uri="{BB962C8B-B14F-4D97-AF65-F5344CB8AC3E}">
+        <p14:creationId xmlns:p14="http://schemas.microsoft.com/office/powerpoint/2010/main" val="2899625024"/>
+      </p:ext>
+    </p:extLst>
+  </p:cSld>
+  <p:clrMapOvr>
+    <a:masterClrMapping/>
+  </p:clrMapOvr>
+</p:sld>
+</file>
+
+<file path=ppt/slides/slide22.xml><?xml version="1.0" encoding="utf-8"?>
+<p:sld xmlns:a="http://schemas.openxmlformats.org/drawingml/2006/main" xmlns:r="http://schemas.openxmlformats.org/officeDocument/2006/relationships" xmlns:p="http://schemas.openxmlformats.org/presentationml/2006/main">
+  <p:cSld>
+    <p:spTree>
+      <p:nvGrpSpPr>
+        <p:cNvPr id="1" name=""/>
+        <p:cNvGrpSpPr/>
+        <p:nvPr/>
+      </p:nvGrpSpPr>
+      <p:grpSpPr>
+        <a:xfrm>
+          <a:off x="0" y="0"/>
+          <a:ext cx="0" cy="0"/>
+          <a:chOff x="0" y="0"/>
+          <a:chExt cx="0" cy="0"/>
+        </a:xfrm>
+      </p:grpSpPr>
+      <p:pic>
+        <p:nvPicPr>
+          <p:cNvPr id="10" name="Picture 9"/>
+          <p:cNvPicPr>
+            <a:picLocks noChangeAspect="1"/>
+          </p:cNvPicPr>
+          <p:nvPr/>
+        </p:nvPicPr>
+        <p:blipFill rotWithShape="1">
+          <a:blip r:embed="rId2">
+            <a:extLst>
+              <a:ext uri="{28A0092B-C50C-407E-A947-70E740481C1C}">
+                <a14:useLocalDpi xmlns:a14="http://schemas.microsoft.com/office/drawing/2010/main" val="0"/>
+              </a:ext>
+            </a:extLst>
+          </a:blip>
+          <a:srcRect l="50728" t="56371"/>
+          <a:stretch/>
+        </p:blipFill>
+        <p:spPr>
+          <a:xfrm>
+            <a:off x="12204691" y="3316148"/>
+            <a:ext cx="6083309" cy="6970854"/>
+          </a:xfrm>
+          <a:prstGeom prst="rect">
+            <a:avLst/>
+          </a:prstGeom>
+        </p:spPr>
+      </p:pic>
+      <p:pic>
+        <p:nvPicPr>
+          <p:cNvPr id="4" name="Picture 3"/>
+          <p:cNvPicPr>
+            <a:picLocks noChangeAspect="1"/>
+          </p:cNvPicPr>
+          <p:nvPr/>
+        </p:nvPicPr>
+        <p:blipFill>
+          <a:blip r:embed="rId3">
+            <a:extLst>
+              <a:ext uri="{28A0092B-C50C-407E-A947-70E740481C1C}">
+                <a14:useLocalDpi xmlns:a14="http://schemas.microsoft.com/office/drawing/2010/main" val="0"/>
+              </a:ext>
+            </a:extLst>
+          </a:blip>
+          <a:stretch>
+            <a:fillRect/>
+          </a:stretch>
+        </p:blipFill>
+        <p:spPr>
+          <a:xfrm>
+            <a:off x="-807744" y="-3724155"/>
+            <a:ext cx="15257208" cy="11189825"/>
+          </a:xfrm>
+          <a:prstGeom prst="rect">
+            <a:avLst/>
+          </a:prstGeom>
+        </p:spPr>
+      </p:pic>
+      <p:sp>
+        <p:nvSpPr>
+          <p:cNvPr id="11" name="TextBox 10"/>
+          <p:cNvSpPr txBox="1"/>
+          <p:nvPr/>
+        </p:nvSpPr>
+        <p:spPr>
+          <a:xfrm>
+            <a:off x="486137" y="2531318"/>
             <a:ext cx="11979797" cy="5078313"/>
           </a:xfrm>
           <a:prstGeom prst="rect">
@@ -7855,6 +8310,352 @@
   <p:cSld>
     <p:spTree>
       <p:nvGrpSpPr>
+        <p:cNvPr id="1" name="">
+          <a:extLst>
+            <a:ext uri="{FF2B5EF4-FFF2-40B4-BE49-F238E27FC236}">
+              <a16:creationId xmlns:a16="http://schemas.microsoft.com/office/drawing/2014/main" id="{AFD94376-F1A9-FF20-66A2-05AFEE791D7C}"/>
+            </a:ext>
+          </a:extLst>
+        </p:cNvPr>
+        <p:cNvGrpSpPr/>
+        <p:nvPr/>
+      </p:nvGrpSpPr>
+      <p:grpSpPr>
+        <a:xfrm>
+          <a:off x="0" y="0"/>
+          <a:ext cx="0" cy="0"/>
+          <a:chOff x="0" y="0"/>
+          <a:chExt cx="0" cy="0"/>
+        </a:xfrm>
+      </p:grpSpPr>
+      <p:sp>
+        <p:nvSpPr>
+          <p:cNvPr id="4" name="Rectangle 3">
+            <a:extLst>
+              <a:ext uri="{FF2B5EF4-FFF2-40B4-BE49-F238E27FC236}">
+                <a16:creationId xmlns:a16="http://schemas.microsoft.com/office/drawing/2014/main" id="{9370B26B-5BBB-A334-192B-F5B0FDDC1D32}"/>
+              </a:ext>
+            </a:extLst>
+          </p:cNvPr>
+          <p:cNvSpPr/>
+          <p:nvPr/>
+        </p:nvSpPr>
+        <p:spPr>
+          <a:xfrm>
+            <a:off x="10591800" y="0"/>
+            <a:ext cx="7696200" cy="10287000"/>
+          </a:xfrm>
+          <a:prstGeom prst="rect">
+            <a:avLst/>
+          </a:prstGeom>
+          <a:solidFill>
+            <a:srgbClr val="CF3338"/>
+          </a:solidFill>
+          <a:ln>
+            <a:noFill/>
+          </a:ln>
+        </p:spPr>
+        <p:style>
+          <a:lnRef idx="2">
+            <a:schemeClr val="accent1">
+              <a:shade val="50000"/>
+            </a:schemeClr>
+          </a:lnRef>
+          <a:fillRef idx="1">
+            <a:schemeClr val="accent1"/>
+          </a:fillRef>
+          <a:effectRef idx="0">
+            <a:schemeClr val="accent1"/>
+          </a:effectRef>
+          <a:fontRef idx="minor">
+            <a:schemeClr val="lt1"/>
+          </a:fontRef>
+        </p:style>
+        <p:txBody>
+          <a:bodyPr rtlCol="0" anchor="ctr"/>
+          <a:lstStyle/>
+          <a:p>
+            <a:pPr algn="ctr"/>
+            <a:endParaRPr lang="en-US" sz="2700"/>
+          </a:p>
+        </p:txBody>
+      </p:sp>
+      <p:pic>
+        <p:nvPicPr>
+          <p:cNvPr id="2" name="Picture 1">
+            <a:extLst>
+              <a:ext uri="{FF2B5EF4-FFF2-40B4-BE49-F238E27FC236}">
+                <a16:creationId xmlns:a16="http://schemas.microsoft.com/office/drawing/2014/main" id="{9715CCA2-92FF-1D8B-CA38-609E06D57870}"/>
+              </a:ext>
+            </a:extLst>
+          </p:cNvPr>
+          <p:cNvPicPr>
+            <a:picLocks noChangeAspect="1"/>
+          </p:cNvPicPr>
+          <p:nvPr/>
+        </p:nvPicPr>
+        <p:blipFill rotWithShape="1">
+          <a:blip r:embed="rId3">
+            <a:extLst>
+              <a:ext uri="{28A0092B-C50C-407E-A947-70E740481C1C}">
+                <a14:useLocalDpi xmlns:a14="http://schemas.microsoft.com/office/drawing/2010/main" val="0"/>
+              </a:ext>
+            </a:extLst>
+          </a:blip>
+          <a:srcRect l="69227" t="33418" r="20112" b="50548"/>
+          <a:stretch/>
+        </p:blipFill>
+        <p:spPr>
+          <a:xfrm>
+            <a:off x="15579524" y="7544693"/>
+            <a:ext cx="2708477" cy="2987579"/>
+          </a:xfrm>
+          <a:prstGeom prst="rect">
+            <a:avLst/>
+          </a:prstGeom>
+        </p:spPr>
+      </p:pic>
+      <p:sp>
+        <p:nvSpPr>
+          <p:cNvPr id="3" name="TextBox 2">
+            <a:extLst>
+              <a:ext uri="{FF2B5EF4-FFF2-40B4-BE49-F238E27FC236}">
+                <a16:creationId xmlns:a16="http://schemas.microsoft.com/office/drawing/2014/main" id="{CB0A0824-E00E-6FFB-4DEE-F26019985651}"/>
+              </a:ext>
+            </a:extLst>
+          </p:cNvPr>
+          <p:cNvSpPr txBox="1"/>
+          <p:nvPr/>
+        </p:nvSpPr>
+        <p:spPr>
+          <a:xfrm>
+            <a:off x="260430" y="329879"/>
+            <a:ext cx="10255169" cy="9864752"/>
+          </a:xfrm>
+          <a:prstGeom prst="rect">
+            <a:avLst/>
+          </a:prstGeom>
+          <a:noFill/>
+        </p:spPr>
+        <p:txBody>
+          <a:bodyPr wrap="square" rtlCol="0">
+            <a:spAutoFit/>
+          </a:bodyPr>
+          <a:lstStyle/>
+          <a:p>
+            <a:r>
+              <a:rPr lang="en-US" sz="6000" b="1" dirty="0">
+                <a:solidFill>
+                  <a:srgbClr val="CF3338"/>
+                </a:solidFill>
+                <a:latin typeface="Pragmatica" panose="020B0403040502020204" pitchFamily="34" charset="0"/>
+              </a:rPr>
+              <a:t>Exercise: Python in Excel essentials</a:t>
+            </a:r>
+          </a:p>
+          <a:p>
+            <a:r>
+              <a:rPr lang="en-US" sz="3600" dirty="0">
+                <a:solidFill>
+                  <a:srgbClr val="CF3338"/>
+                </a:solidFill>
+                <a:latin typeface="Pragmatica" panose="020B0403040502020204" pitchFamily="34" charset="0"/>
+              </a:rPr>
+              <a:t>Dataset: wholesale-customers.csv </a:t>
+            </a:r>
+            <a:endParaRPr lang="en-US" sz="6600" b="1" dirty="0">
+              <a:solidFill>
+                <a:srgbClr val="CF3338"/>
+              </a:solidFill>
+              <a:latin typeface="Pragmatica" panose="020B0403040502020204" pitchFamily="34" charset="0"/>
+            </a:endParaRPr>
+          </a:p>
+          <a:p>
+            <a:endParaRPr lang="en-US" sz="4200" dirty="0">
+              <a:solidFill>
+                <a:srgbClr val="CF3338"/>
+              </a:solidFill>
+              <a:latin typeface="Pragmatica" panose="020B0403040502020204" pitchFamily="34" charset="0"/>
+            </a:endParaRPr>
+          </a:p>
+          <a:p>
+            <a:pPr marL="714375" indent="-571500">
+              <a:lnSpc>
+                <a:spcPct val="115000"/>
+              </a:lnSpc>
+              <a:spcBef>
+                <a:spcPts val="1125"/>
+              </a:spcBef>
+              <a:buClr>
+                <a:srgbClr val="C00000"/>
+              </a:buClr>
+              <a:buSzPts val="2100"/>
+              <a:buFont typeface="Arial" panose="020B0604020202020204" pitchFamily="34" charset="0"/>
+              <a:buChar char="•"/>
+            </a:pPr>
+            <a:r>
+              <a:rPr lang="en-US" sz="3600" dirty="0">
+                <a:solidFill>
+                  <a:srgbClr val="C00000"/>
+                </a:solidFill>
+                <a:latin typeface="Pragmatica" panose="020B0403040502020204"/>
+                <a:sym typeface="Consolas"/>
+              </a:rPr>
+              <a:t>Import into Excel via Power Query (Get Data &gt; From File &gt; From Text/CSV)</a:t>
+            </a:r>
+          </a:p>
+          <a:p>
+            <a:pPr marL="714375" indent="-571500">
+              <a:lnSpc>
+                <a:spcPct val="115000"/>
+              </a:lnSpc>
+              <a:spcBef>
+                <a:spcPts val="1125"/>
+              </a:spcBef>
+              <a:buClr>
+                <a:srgbClr val="C00000"/>
+              </a:buClr>
+              <a:buSzPts val="2100"/>
+              <a:buFont typeface="Arial" panose="020B0604020202020204" pitchFamily="34" charset="0"/>
+              <a:buChar char="•"/>
+            </a:pPr>
+            <a:r>
+              <a:rPr lang="en-US" sz="3600" dirty="0">
+                <a:solidFill>
+                  <a:srgbClr val="C00000"/>
+                </a:solidFill>
+                <a:latin typeface="Pragmatica" panose="020B0403040502020204"/>
+                <a:sym typeface="Consolas"/>
+              </a:rPr>
+              <a:t>Unpivot the Fresh through </a:t>
+            </a:r>
+            <a:r>
+              <a:rPr lang="en-US" sz="3600" dirty="0" err="1">
+                <a:solidFill>
+                  <a:srgbClr val="C00000"/>
+                </a:solidFill>
+                <a:latin typeface="Pragmatica" panose="020B0403040502020204"/>
+                <a:sym typeface="Consolas"/>
+              </a:rPr>
+              <a:t>Delicassen</a:t>
+            </a:r>
+            <a:r>
+              <a:rPr lang="en-US" sz="3600" dirty="0">
+                <a:solidFill>
+                  <a:srgbClr val="C00000"/>
+                </a:solidFill>
+                <a:latin typeface="Pragmatica" panose="020B0403040502020204"/>
+                <a:sym typeface="Consolas"/>
+              </a:rPr>
+              <a:t> [sic] columns</a:t>
+            </a:r>
+          </a:p>
+          <a:p>
+            <a:pPr marL="714375" indent="-571500">
+              <a:lnSpc>
+                <a:spcPct val="115000"/>
+              </a:lnSpc>
+              <a:spcBef>
+                <a:spcPts val="1125"/>
+              </a:spcBef>
+              <a:buClr>
+                <a:srgbClr val="C00000"/>
+              </a:buClr>
+              <a:buSzPts val="2100"/>
+              <a:buFont typeface="Arial" panose="020B0604020202020204" pitchFamily="34" charset="0"/>
+              <a:buChar char="•"/>
+            </a:pPr>
+            <a:r>
+              <a:rPr lang="en-US" sz="3600" dirty="0">
+                <a:solidFill>
+                  <a:srgbClr val="C00000"/>
+                </a:solidFill>
+                <a:latin typeface="Pragmatica" panose="020B0403040502020204"/>
+                <a:sym typeface="Consolas"/>
+              </a:rPr>
+              <a:t>Load as connection into Python in Excel</a:t>
+            </a:r>
+          </a:p>
+          <a:p>
+            <a:pPr marL="714375" indent="-571500">
+              <a:lnSpc>
+                <a:spcPct val="115000"/>
+              </a:lnSpc>
+              <a:spcBef>
+                <a:spcPts val="1125"/>
+              </a:spcBef>
+              <a:buClr>
+                <a:srgbClr val="C00000"/>
+              </a:buClr>
+              <a:buSzPts val="2100"/>
+              <a:buFont typeface="Arial" panose="020B0604020202020204" pitchFamily="34" charset="0"/>
+              <a:buChar char="•"/>
+            </a:pPr>
+            <a:r>
+              <a:rPr lang="en-US" sz="3600" dirty="0">
+                <a:solidFill>
+                  <a:srgbClr val="C00000"/>
+                </a:solidFill>
+                <a:latin typeface="Pragmatica" panose="020B0403040502020204"/>
+                <a:sym typeface="Consolas"/>
+              </a:rPr>
+              <a:t>Preview the data with a linked data type</a:t>
+            </a:r>
+          </a:p>
+          <a:p>
+            <a:pPr marL="714375" indent="-571500">
+              <a:lnSpc>
+                <a:spcPct val="115000"/>
+              </a:lnSpc>
+              <a:spcBef>
+                <a:spcPts val="1125"/>
+              </a:spcBef>
+              <a:buClr>
+                <a:srgbClr val="C00000"/>
+              </a:buClr>
+              <a:buSzPts val="2100"/>
+              <a:buFont typeface="Arial" panose="020B0604020202020204" pitchFamily="34" charset="0"/>
+              <a:buChar char="•"/>
+            </a:pPr>
+            <a:r>
+              <a:rPr lang="en-US" sz="3600" dirty="0">
+                <a:solidFill>
+                  <a:srgbClr val="C00000"/>
+                </a:solidFill>
+                <a:latin typeface="Pragmatica" panose="020B0403040502020204"/>
+                <a:sym typeface="Consolas"/>
+              </a:rPr>
+              <a:t>Count the number of nonblank cells in the preview area with a spill operator</a:t>
+            </a:r>
+          </a:p>
+          <a:p>
+            <a:endParaRPr lang="en-US" sz="6000" dirty="0">
+              <a:solidFill>
+                <a:srgbClr val="CF3338"/>
+              </a:solidFill>
+              <a:latin typeface="Pragmatica" panose="020B0403040502020204" pitchFamily="34" charset="0"/>
+            </a:endParaRPr>
+          </a:p>
+        </p:txBody>
+      </p:sp>
+    </p:spTree>
+    <p:extLst>
+      <p:ext uri="{BB962C8B-B14F-4D97-AF65-F5344CB8AC3E}">
+        <p14:creationId xmlns:p14="http://schemas.microsoft.com/office/powerpoint/2010/main" val="3341142562"/>
+      </p:ext>
+    </p:extLst>
+  </p:cSld>
+  <p:clrMapOvr>
+    <a:masterClrMapping/>
+  </p:clrMapOvr>
+</p:sld>
+</file>
+
+<file path=ppt/slides/slide4.xml><?xml version="1.0" encoding="utf-8"?>
+<p:sld xmlns:a="http://schemas.openxmlformats.org/drawingml/2006/main" xmlns:r="http://schemas.openxmlformats.org/officeDocument/2006/relationships" xmlns:p="http://schemas.openxmlformats.org/presentationml/2006/main">
+  <p:cSld>
+    <p:spTree>
+      <p:nvGrpSpPr>
         <p:cNvPr id="1" name=""/>
         <p:cNvGrpSpPr/>
         <p:nvPr/>
@@ -7960,7 +8761,7 @@
 </p:sld>
 </file>
 
-<file path=ppt/slides/slide4.xml><?xml version="1.0" encoding="utf-8"?>
+<file path=ppt/slides/slide5.xml><?xml version="1.0" encoding="utf-8"?>
 <p:sld xmlns:a="http://schemas.openxmlformats.org/drawingml/2006/main" xmlns:r="http://schemas.openxmlformats.org/officeDocument/2006/relationships" xmlns:p="http://schemas.openxmlformats.org/presentationml/2006/main">
   <p:cSld>
     <p:spTree>
@@ -8260,7 +9061,7 @@
 </p:sld>
 </file>
 
-<file path=ppt/slides/slide5.xml><?xml version="1.0" encoding="utf-8"?>
+<file path=ppt/slides/slide6.xml><?xml version="1.0" encoding="utf-8"?>
 <p:sld xmlns:a="http://schemas.openxmlformats.org/drawingml/2006/main" xmlns:r="http://schemas.openxmlformats.org/officeDocument/2006/relationships" xmlns:p="http://schemas.openxmlformats.org/presentationml/2006/main">
   <p:cSld>
     <p:spTree>
@@ -8442,7 +9243,7 @@
 </p:sld>
 </file>
 
-<file path=ppt/slides/slide6.xml><?xml version="1.0" encoding="utf-8"?>
+<file path=ppt/slides/slide7.xml><?xml version="1.0" encoding="utf-8"?>
 <p:sld xmlns:a="http://schemas.openxmlformats.org/drawingml/2006/main" xmlns:r="http://schemas.openxmlformats.org/officeDocument/2006/relationships" xmlns:p="http://schemas.openxmlformats.org/presentationml/2006/main">
   <p:cSld>
     <p:spTree>
@@ -8570,7 +9371,7 @@
 </p:sld>
 </file>
 
-<file path=ppt/slides/slide7.xml><?xml version="1.0" encoding="utf-8"?>
+<file path=ppt/slides/slide8.xml><?xml version="1.0" encoding="utf-8"?>
 <p:sld xmlns:a="http://schemas.openxmlformats.org/drawingml/2006/main" xmlns:r="http://schemas.openxmlformats.org/officeDocument/2006/relationships" xmlns:p="http://schemas.openxmlformats.org/presentationml/2006/main">
   <p:cSld>
     <p:spTree>
@@ -8848,7 +9649,7 @@
 </p:sld>
 </file>
 
-<file path=ppt/slides/slide8.xml><?xml version="1.0" encoding="utf-8"?>
+<file path=ppt/slides/slide9.xml><?xml version="1.0" encoding="utf-8"?>
 <p:sld xmlns:a="http://schemas.openxmlformats.org/drawingml/2006/main" xmlns:r="http://schemas.openxmlformats.org/officeDocument/2006/relationships" xmlns:p="http://schemas.openxmlformats.org/presentationml/2006/main">
   <p:cSld>
     <p:spTree>
@@ -9201,328 +10002,6 @@
     <p:extLst>
       <p:ext uri="{BB962C8B-B14F-4D97-AF65-F5344CB8AC3E}">
         <p14:creationId xmlns:p14="http://schemas.microsoft.com/office/powerpoint/2010/main" val="3296424572"/>
-      </p:ext>
-    </p:extLst>
-  </p:cSld>
-  <p:clrMapOvr>
-    <a:masterClrMapping/>
-  </p:clrMapOvr>
-</p:sld>
-</file>
-
-<file path=ppt/slides/slide9.xml><?xml version="1.0" encoding="utf-8"?>
-<p:sld xmlns:a="http://schemas.openxmlformats.org/drawingml/2006/main" xmlns:r="http://schemas.openxmlformats.org/officeDocument/2006/relationships" xmlns:p="http://schemas.openxmlformats.org/presentationml/2006/main">
-  <p:cSld>
-    <p:spTree>
-      <p:nvGrpSpPr>
-        <p:cNvPr id="1" name="">
-          <a:extLst>
-            <a:ext uri="{FF2B5EF4-FFF2-40B4-BE49-F238E27FC236}">
-              <a16:creationId xmlns:a16="http://schemas.microsoft.com/office/drawing/2014/main" id="{1D08595B-B0F6-3D15-07B7-C94576D901BB}"/>
-            </a:ext>
-          </a:extLst>
-        </p:cNvPr>
-        <p:cNvGrpSpPr/>
-        <p:nvPr/>
-      </p:nvGrpSpPr>
-      <p:grpSpPr>
-        <a:xfrm>
-          <a:off x="0" y="0"/>
-          <a:ext cx="0" cy="0"/>
-          <a:chOff x="0" y="0"/>
-          <a:chExt cx="0" cy="0"/>
-        </a:xfrm>
-      </p:grpSpPr>
-      <p:sp>
-        <p:nvSpPr>
-          <p:cNvPr id="4" name="Rectangle 3">
-            <a:extLst>
-              <a:ext uri="{FF2B5EF4-FFF2-40B4-BE49-F238E27FC236}">
-                <a16:creationId xmlns:a16="http://schemas.microsoft.com/office/drawing/2014/main" id="{D2164974-38B7-0BB3-1F4A-12AF2DBA4615}"/>
-              </a:ext>
-            </a:extLst>
-          </p:cNvPr>
-          <p:cNvSpPr/>
-          <p:nvPr/>
-        </p:nvSpPr>
-        <p:spPr>
-          <a:xfrm>
-            <a:off x="10820400" y="0"/>
-            <a:ext cx="7467600" cy="10287000"/>
-          </a:xfrm>
-          <a:prstGeom prst="rect">
-            <a:avLst/>
-          </a:prstGeom>
-          <a:solidFill>
-            <a:srgbClr val="CF3338"/>
-          </a:solidFill>
-          <a:ln>
-            <a:noFill/>
-          </a:ln>
-        </p:spPr>
-        <p:style>
-          <a:lnRef idx="2">
-            <a:schemeClr val="accent1">
-              <a:shade val="50000"/>
-            </a:schemeClr>
-          </a:lnRef>
-          <a:fillRef idx="1">
-            <a:schemeClr val="accent1"/>
-          </a:fillRef>
-          <a:effectRef idx="0">
-            <a:schemeClr val="accent1"/>
-          </a:effectRef>
-          <a:fontRef idx="minor">
-            <a:schemeClr val="lt1"/>
-          </a:fontRef>
-        </p:style>
-        <p:txBody>
-          <a:bodyPr rtlCol="0" anchor="ctr"/>
-          <a:lstStyle/>
-          <a:p>
-            <a:pPr algn="ctr"/>
-            <a:endParaRPr lang="en-US" sz="2700"/>
-          </a:p>
-        </p:txBody>
-      </p:sp>
-      <p:pic>
-        <p:nvPicPr>
-          <p:cNvPr id="2" name="Picture 1">
-            <a:extLst>
-              <a:ext uri="{FF2B5EF4-FFF2-40B4-BE49-F238E27FC236}">
-                <a16:creationId xmlns:a16="http://schemas.microsoft.com/office/drawing/2014/main" id="{3B16401F-D91C-1A9E-AB41-9BB7999B59A3}"/>
-              </a:ext>
-            </a:extLst>
-          </p:cNvPr>
-          <p:cNvPicPr>
-            <a:picLocks noChangeAspect="1"/>
-          </p:cNvPicPr>
-          <p:nvPr/>
-        </p:nvPicPr>
-        <p:blipFill rotWithShape="1">
-          <a:blip r:embed="rId3">
-            <a:extLst>
-              <a:ext uri="{28A0092B-C50C-407E-A947-70E740481C1C}">
-                <a14:useLocalDpi xmlns:a14="http://schemas.microsoft.com/office/drawing/2010/main" val="0"/>
-              </a:ext>
-            </a:extLst>
-          </a:blip>
-          <a:srcRect l="69227" t="33418" r="20112" b="50548"/>
-          <a:stretch/>
-        </p:blipFill>
-        <p:spPr>
-          <a:xfrm>
-            <a:off x="15579524" y="7544693"/>
-            <a:ext cx="2708477" cy="2987579"/>
-          </a:xfrm>
-          <a:prstGeom prst="rect">
-            <a:avLst/>
-          </a:prstGeom>
-        </p:spPr>
-      </p:pic>
-      <p:sp>
-        <p:nvSpPr>
-          <p:cNvPr id="3" name="TextBox 2">
-            <a:extLst>
-              <a:ext uri="{FF2B5EF4-FFF2-40B4-BE49-F238E27FC236}">
-                <a16:creationId xmlns:a16="http://schemas.microsoft.com/office/drawing/2014/main" id="{E68C40A9-B365-4386-CB2C-8AB566EEE6AD}"/>
-              </a:ext>
-            </a:extLst>
-          </p:cNvPr>
-          <p:cNvSpPr txBox="1"/>
-          <p:nvPr/>
-        </p:nvSpPr>
-        <p:spPr>
-          <a:xfrm>
-            <a:off x="228600" y="114300"/>
-            <a:ext cx="10352567" cy="10365915"/>
-          </a:xfrm>
-          <a:prstGeom prst="rect">
-            <a:avLst/>
-          </a:prstGeom>
-          <a:noFill/>
-        </p:spPr>
-        <p:txBody>
-          <a:bodyPr wrap="square" rtlCol="0">
-            <a:spAutoFit/>
-          </a:bodyPr>
-          <a:lstStyle/>
-          <a:p>
-            <a:r>
-              <a:rPr lang="en-US" sz="6000" b="1" dirty="0">
-                <a:solidFill>
-                  <a:srgbClr val="CF3338"/>
-                </a:solidFill>
-                <a:latin typeface="Pragmatica" panose="020B0403040502020204" pitchFamily="34" charset="0"/>
-              </a:rPr>
-              <a:t>Creating advanced data visualizations with Copilot EXERCISE</a:t>
-            </a:r>
-          </a:p>
-          <a:p>
-            <a:pPr marL="142875">
-              <a:lnSpc>
-                <a:spcPct val="115000"/>
-              </a:lnSpc>
-              <a:spcBef>
-                <a:spcPts val="1125"/>
-              </a:spcBef>
-              <a:buClr>
-                <a:srgbClr val="C00000"/>
-              </a:buClr>
-              <a:buSzPts val="2100"/>
-            </a:pPr>
-            <a:r>
-              <a:rPr lang="en-US" sz="3600" dirty="0">
-                <a:solidFill>
-                  <a:srgbClr val="C00000"/>
-                </a:solidFill>
-                <a:latin typeface="Pragmatica" panose="020B0403040502020204"/>
-                <a:sym typeface="Consolas"/>
-              </a:rPr>
-              <a:t>Dataset: copilot-dashboard-start.xlsx</a:t>
-            </a:r>
-          </a:p>
-          <a:p>
-            <a:pPr marL="714375" indent="-571500">
-              <a:lnSpc>
-                <a:spcPct val="115000"/>
-              </a:lnSpc>
-              <a:spcBef>
-                <a:spcPts val="1125"/>
-              </a:spcBef>
-              <a:buClr>
-                <a:srgbClr val="C00000"/>
-              </a:buClr>
-              <a:buSzPts val="2100"/>
-              <a:buFont typeface="Arial" panose="020B0604020202020204" pitchFamily="34" charset="0"/>
-              <a:buChar char="•"/>
-            </a:pPr>
-            <a:endParaRPr lang="en-US" sz="3600" dirty="0">
-              <a:solidFill>
-                <a:srgbClr val="C00000"/>
-              </a:solidFill>
-              <a:latin typeface="Pragmatica" panose="020B0403040502020204"/>
-              <a:sym typeface="Consolas"/>
-            </a:endParaRPr>
-          </a:p>
-          <a:p>
-            <a:pPr marL="714375" indent="-571500">
-              <a:lnSpc>
-                <a:spcPct val="115000"/>
-              </a:lnSpc>
-              <a:spcBef>
-                <a:spcPts val="1125"/>
-              </a:spcBef>
-              <a:buClr>
-                <a:srgbClr val="C00000"/>
-              </a:buClr>
-              <a:buSzPts val="2100"/>
-              <a:buFont typeface="Arial" panose="020B0604020202020204" pitchFamily="34" charset="0"/>
-              <a:buChar char="•"/>
-            </a:pPr>
-            <a:r>
-              <a:rPr lang="en-US" sz="3600" dirty="0">
-                <a:solidFill>
-                  <a:srgbClr val="C00000"/>
-                </a:solidFill>
-                <a:latin typeface="Pragmatica" panose="020B0403040502020204"/>
-                <a:sym typeface="Consolas"/>
-              </a:rPr>
-              <a:t>Use Advanced Analysis to create visualizations for a dashboard</a:t>
-            </a:r>
-          </a:p>
-          <a:p>
-            <a:pPr marL="714375" indent="-571500">
-              <a:lnSpc>
-                <a:spcPct val="115000"/>
-              </a:lnSpc>
-              <a:spcBef>
-                <a:spcPts val="1125"/>
-              </a:spcBef>
-              <a:buClr>
-                <a:srgbClr val="C00000"/>
-              </a:buClr>
-              <a:buSzPts val="2100"/>
-              <a:buFont typeface="Arial" panose="020B0604020202020204" pitchFamily="34" charset="0"/>
-              <a:buChar char="•"/>
-            </a:pPr>
-            <a:r>
-              <a:rPr lang="en-US" sz="3600" dirty="0">
-                <a:solidFill>
-                  <a:srgbClr val="C00000"/>
-                </a:solidFill>
-                <a:latin typeface="Pragmatica" panose="020B0403040502020204"/>
-                <a:sym typeface="Consolas"/>
-              </a:rPr>
-              <a:t>Check mpg-dashboard-prompt.txt for a sample input prompt</a:t>
-            </a:r>
-          </a:p>
-          <a:p>
-            <a:pPr marL="714375" indent="-571500">
-              <a:lnSpc>
-                <a:spcPct val="115000"/>
-              </a:lnSpc>
-              <a:spcBef>
-                <a:spcPts val="1125"/>
-              </a:spcBef>
-              <a:buClr>
-                <a:srgbClr val="C00000"/>
-              </a:buClr>
-              <a:buSzPts val="2100"/>
-              <a:buFont typeface="Arial" panose="020B0604020202020204" pitchFamily="34" charset="0"/>
-              <a:buChar char="•"/>
-            </a:pPr>
-            <a:r>
-              <a:rPr lang="en-US" sz="3600" dirty="0">
-                <a:solidFill>
-                  <a:srgbClr val="C00000"/>
-                </a:solidFill>
-                <a:latin typeface="Pragmatica" panose="020B0403040502020204"/>
-                <a:sym typeface="Consolas"/>
-              </a:rPr>
-              <a:t>We’ll walk through assembling the dashboard together</a:t>
-            </a:r>
-          </a:p>
-          <a:p>
-            <a:pPr marL="714375" indent="-571500">
-              <a:lnSpc>
-                <a:spcPct val="115000"/>
-              </a:lnSpc>
-              <a:spcBef>
-                <a:spcPts val="1125"/>
-              </a:spcBef>
-              <a:buClr>
-                <a:srgbClr val="C00000"/>
-              </a:buClr>
-              <a:buSzPts val="2100"/>
-              <a:buFont typeface="Arial" panose="020B0604020202020204" pitchFamily="34" charset="0"/>
-              <a:buChar char="•"/>
-            </a:pPr>
-            <a:r>
-              <a:rPr lang="en-US" sz="3600" dirty="0">
-                <a:solidFill>
-                  <a:srgbClr val="C00000"/>
-                </a:solidFill>
-                <a:latin typeface="Pragmatica" panose="020B0403040502020204"/>
-                <a:sym typeface="Consolas"/>
-              </a:rPr>
-              <a:t>Your results will vary from mine… embrace it!</a:t>
-            </a:r>
-          </a:p>
-          <a:p>
-            <a:endParaRPr lang="en-US" sz="6000" dirty="0">
-              <a:solidFill>
-                <a:srgbClr val="CF3338"/>
-              </a:solidFill>
-              <a:latin typeface="Pragmatica" panose="020B0403040502020204" pitchFamily="34" charset="0"/>
-            </a:endParaRPr>
-          </a:p>
-        </p:txBody>
-      </p:sp>
-    </p:spTree>
-    <p:extLst>
-      <p:ext uri="{BB962C8B-B14F-4D97-AF65-F5344CB8AC3E}">
-        <p14:creationId xmlns:p14="http://schemas.microsoft.com/office/powerpoint/2010/main" val="1152180219"/>
       </p:ext>
     </p:extLst>
   </p:cSld>

</xml_diff>